<commit_message>
Final edit of presentation
</commit_message>
<xml_diff>
--- a/ADA Presentation (1).pptx
+++ b/ADA Presentation (1).pptx
@@ -2,7 +2,7 @@
 <file path=ppt/presentation.xml><?xml version="1.0" encoding="utf-8"?>
 <p:presentation xmlns:a="http://schemas.openxmlformats.org/drawingml/2006/main" xmlns:r="http://schemas.openxmlformats.org/officeDocument/2006/relationships" xmlns:p="http://schemas.openxmlformats.org/presentationml/2006/main" saveSubsetFonts="1">
   <p:sldMasterIdLst>
-    <p:sldMasterId id="2147483648" r:id="rId1"/>
+    <p:sldMasterId id="2147483660" r:id="rId1"/>
   </p:sldMasterIdLst>
   <p:notesMasterIdLst>
     <p:notesMasterId r:id="rId18"/>
@@ -131,7 +131,7 @@
 </file>
 
 <file path=ppt/charts/chart1.xml><?xml version="1.0" encoding="utf-8"?>
-<c:chartSpace xmlns:c="http://schemas.openxmlformats.org/drawingml/2006/chart" xmlns:a="http://schemas.openxmlformats.org/drawingml/2006/main" xmlns:r="http://schemas.openxmlformats.org/officeDocument/2006/relationships" xmlns:c16r2="http://schemas.microsoft.com/office/drawing/2015/06/chart">
+<c:chartSpace xmlns:c="http://schemas.openxmlformats.org/drawingml/2006/chart" xmlns:a="http://schemas.openxmlformats.org/drawingml/2006/main" xmlns:r="http://schemas.openxmlformats.org/officeDocument/2006/relationships">
   <c:date1904 val="0"/>
   <c:lang val="en-US"/>
   <c:roundedCorners val="0"/>
@@ -296,7 +296,7 @@
               </c:numCache>
             </c:numRef>
           </c:val>
-          <c:extLst>
+          <c:extLst xmlns:c16r2="http://schemas.microsoft.com/office/drawing/2015/06/chart">
             <c:ext xmlns:c16="http://schemas.microsoft.com/office/drawing/2014/chart" uri="{C3380CC4-5D6E-409C-BE32-E72D297353CC}">
               <c16:uniqueId val="{00000000-ABC4-4BF9-985B-BDE84D898B0F}"/>
             </c:ext>
@@ -391,7 +391,7 @@
               </c:numCache>
             </c:numRef>
           </c:val>
-          <c:extLst>
+          <c:extLst xmlns:c16r2="http://schemas.microsoft.com/office/drawing/2015/06/chart">
             <c:ext xmlns:c16="http://schemas.microsoft.com/office/drawing/2014/chart" uri="{C3380CC4-5D6E-409C-BE32-E72D297353CC}">
               <c16:uniqueId val="{00000001-ABC4-4BF9-985B-BDE84D898B0F}"/>
             </c:ext>
@@ -407,11 +407,11 @@
         </c:dLbls>
         <c:gapWidth val="219"/>
         <c:overlap val="-27"/>
-        <c:axId val="504157776"/>
-        <c:axId val="504151896"/>
+        <c:axId val="266426896"/>
+        <c:axId val="266419840"/>
       </c:barChart>
       <c:catAx>
-        <c:axId val="504157776"/>
+        <c:axId val="266426896"/>
         <c:scaling>
           <c:orientation val="minMax"/>
         </c:scaling>
@@ -454,7 +454,7 @@
             <a:endParaRPr lang="en-US"/>
           </a:p>
         </c:txPr>
-        <c:crossAx val="504151896"/>
+        <c:crossAx val="266419840"/>
         <c:crosses val="autoZero"/>
         <c:auto val="1"/>
         <c:lblAlgn val="ctr"/>
@@ -462,7 +462,7 @@
         <c:noMultiLvlLbl val="0"/>
       </c:catAx>
       <c:valAx>
-        <c:axId val="504151896"/>
+        <c:axId val="266419840"/>
         <c:scaling>
           <c:orientation val="minMax"/>
           <c:min val="0"/>
@@ -570,7 +570,7 @@
             <a:endParaRPr lang="en-US"/>
           </a:p>
         </c:txPr>
-        <c:crossAx val="504157776"/>
+        <c:crossAx val="266426896"/>
         <c:crosses val="autoZero"/>
         <c:crossBetween val="between"/>
       </c:valAx>
@@ -642,7 +642,7 @@
 </file>
 
 <file path=ppt/charts/chart2.xml><?xml version="1.0" encoding="utf-8"?>
-<c:chartSpace xmlns:c="http://schemas.openxmlformats.org/drawingml/2006/chart" xmlns:a="http://schemas.openxmlformats.org/drawingml/2006/main" xmlns:r="http://schemas.openxmlformats.org/officeDocument/2006/relationships" xmlns:c16r2="http://schemas.microsoft.com/office/drawing/2015/06/chart">
+<c:chartSpace xmlns:c="http://schemas.openxmlformats.org/drawingml/2006/chart" xmlns:a="http://schemas.openxmlformats.org/drawingml/2006/main" xmlns:r="http://schemas.openxmlformats.org/officeDocument/2006/relationships">
   <c:date1904 val="0"/>
   <c:lang val="en-US"/>
   <c:roundedCorners val="0"/>
@@ -850,7 +850,7 @@
               </c:numCache>
             </c:numRef>
           </c:val>
-          <c:extLst>
+          <c:extLst xmlns:c16r2="http://schemas.microsoft.com/office/drawing/2015/06/chart">
             <c:ext xmlns:c16="http://schemas.microsoft.com/office/drawing/2014/chart" uri="{C3380CC4-5D6E-409C-BE32-E72D297353CC}">
               <c16:uniqueId val="{00000000-6E43-40C1-B333-6B7A9C6D555A}"/>
             </c:ext>
@@ -975,7 +975,7 @@
               </c:numCache>
             </c:numRef>
           </c:val>
-          <c:extLst>
+          <c:extLst xmlns:c16r2="http://schemas.microsoft.com/office/drawing/2015/06/chart">
             <c:ext xmlns:c16="http://schemas.microsoft.com/office/drawing/2014/chart" uri="{C3380CC4-5D6E-409C-BE32-E72D297353CC}">
               <c16:uniqueId val="{00000001-6E43-40C1-B333-6B7A9C6D555A}"/>
             </c:ext>
@@ -991,11 +991,11 @@
         </c:dLbls>
         <c:gapWidth val="219"/>
         <c:overlap val="-27"/>
-        <c:axId val="495819816"/>
-        <c:axId val="495822952"/>
+        <c:axId val="269304976"/>
+        <c:axId val="269298704"/>
       </c:barChart>
       <c:catAx>
-        <c:axId val="495819816"/>
+        <c:axId val="269304976"/>
         <c:scaling>
           <c:orientation val="minMax"/>
         </c:scaling>
@@ -1038,7 +1038,7 @@
             <a:endParaRPr lang="en-US"/>
           </a:p>
         </c:txPr>
-        <c:crossAx val="495822952"/>
+        <c:crossAx val="269298704"/>
         <c:crosses val="autoZero"/>
         <c:auto val="1"/>
         <c:lblAlgn val="ctr"/>
@@ -1046,7 +1046,7 @@
         <c:noMultiLvlLbl val="0"/>
       </c:catAx>
       <c:valAx>
-        <c:axId val="495822952"/>
+        <c:axId val="269298704"/>
         <c:scaling>
           <c:orientation val="minMax"/>
         </c:scaling>
@@ -1153,7 +1153,7 @@
             <a:endParaRPr lang="en-US"/>
           </a:p>
         </c:txPr>
-        <c:crossAx val="495819816"/>
+        <c:crossAx val="269304976"/>
         <c:crosses val="autoZero"/>
         <c:crossBetween val="between"/>
       </c:valAx>
@@ -2386,7 +2386,7 @@
           <a:p>
             <a:fld id="{CA34A5C0-8DAA-433F-B401-C4218944FFFA}" type="datetimeFigureOut">
               <a:rPr lang="en-US" smtClean="0"/>
-              <a:t>4/23/2019</a:t>
+              <a:t>4/24/2019</a:t>
             </a:fld>
             <a:endParaRPr lang="en-US"/>
           </a:p>
@@ -2767,7 +2767,7 @@
 </file>
 
 <file path=ppt/slideLayouts/slideLayout1.xml><?xml version="1.0" encoding="utf-8"?>
-<p:sldLayout xmlns:a="http://schemas.openxmlformats.org/drawingml/2006/main" xmlns:r="http://schemas.openxmlformats.org/officeDocument/2006/relationships" xmlns:p="http://schemas.openxmlformats.org/presentationml/2006/main" type="title" preserve="1">
+<p:sldLayout xmlns:a="http://schemas.openxmlformats.org/drawingml/2006/main" xmlns:r="http://schemas.openxmlformats.org/officeDocument/2006/relationships" xmlns:p="http://schemas.openxmlformats.org/presentationml/2006/main" showMasterSp="0" type="title" preserve="1">
   <p:cSld name="Title Slide">
     <p:spTree>
       <p:nvGrpSpPr>
@@ -2783,6 +2783,52 @@
           <a:chExt cx="0" cy="0"/>
         </a:xfrm>
       </p:grpSpPr>
+      <p:pic>
+        <p:nvPicPr>
+          <p:cNvPr id="10" name="Picture 6" descr="Related image"/>
+          <p:cNvPicPr>
+            <a:picLocks noChangeAspect="1" noChangeArrowheads="1"/>
+          </p:cNvPicPr>
+          <p:nvPr/>
+        </p:nvPicPr>
+        <p:blipFill rotWithShape="1">
+          <a:blip r:embed="rId2">
+            <a:duotone>
+              <a:schemeClr val="accent1">
+                <a:shade val="45000"/>
+                <a:satMod val="135000"/>
+              </a:schemeClr>
+              <a:prstClr val="white"/>
+            </a:duotone>
+            <a:extLst>
+              <a:ext uri="{28A0092B-C50C-407E-A947-70E740481C1C}">
+                <a14:useLocalDpi xmlns:a14="http://schemas.microsoft.com/office/drawing/2010/main" val="0"/>
+              </a:ext>
+            </a:extLst>
+          </a:blip>
+          <a:srcRect b="67027"/>
+          <a:stretch/>
+        </p:blipFill>
+        <p:spPr bwMode="auto">
+          <a:xfrm>
+            <a:off x="1587" y="5791200"/>
+            <a:ext cx="12190413" cy="1066800"/>
+          </a:xfrm>
+          <a:prstGeom prst="rect">
+            <a:avLst/>
+          </a:prstGeom>
+          <a:noFill/>
+          <a:extLst>
+            <a:ext uri="{909E8E84-426E-40DD-AFC4-6F175D3DCCD1}">
+              <a14:hiddenFill xmlns:a14="http://schemas.microsoft.com/office/drawing/2010/main">
+                <a:solidFill>
+                  <a:srgbClr val="FFFFFF"/>
+                </a:solidFill>
+              </a14:hiddenFill>
+            </a:ext>
+          </a:extLst>
+        </p:spPr>
+      </p:pic>
       <p:sp>
         <p:nvSpPr>
           <p:cNvPr id="2" name="Title 1"/>
@@ -2795,15 +2841,27 @@
         </p:nvSpPr>
         <p:spPr>
           <a:xfrm>
-            <a:off x="1524000" y="1122363"/>
-            <a:ext cx="9144000" cy="2387600"/>
+            <a:off x="1097280" y="758952"/>
+            <a:ext cx="10058400" cy="3566160"/>
           </a:xfrm>
         </p:spPr>
         <p:txBody>
-          <a:bodyPr anchor="b"/>
+          <a:bodyPr anchor="b">
+            <a:normAutofit/>
+          </a:bodyPr>
           <a:lstStyle>
-            <a:lvl1pPr algn="ctr">
-              <a:defRPr sz="6000"/>
+            <a:lvl1pPr algn="l">
+              <a:lnSpc>
+                <a:spcPct val="85000"/>
+              </a:lnSpc>
+              <a:defRPr sz="8000" spc="-50" baseline="0">
+                <a:solidFill>
+                  <a:schemeClr val="tx1">
+                    <a:lumMod val="85000"/>
+                    <a:lumOff val="15000"/>
+                  </a:schemeClr>
+                </a:solidFill>
+              </a:defRPr>
             </a:lvl1pPr>
           </a:lstStyle>
           <a:p>
@@ -2811,7 +2869,7 @@
               <a:rPr lang="en-US" smtClean="0"/>
               <a:t>Click to edit Master title style</a:t>
             </a:r>
-            <a:endParaRPr lang="en-US"/>
+            <a:endParaRPr lang="en-US" dirty="0"/>
           </a:p>
         </p:txBody>
       </p:sp>
@@ -2827,48 +2885,55 @@
         </p:nvSpPr>
         <p:spPr>
           <a:xfrm>
-            <a:off x="1524000" y="3602038"/>
-            <a:ext cx="9144000" cy="1655762"/>
+            <a:off x="1100051" y="4455621"/>
+            <a:ext cx="10058400" cy="1143000"/>
           </a:xfrm>
         </p:spPr>
         <p:txBody>
-          <a:bodyPr/>
+          <a:bodyPr lIns="91440" rIns="91440">
+            <a:normAutofit/>
+          </a:bodyPr>
           <a:lstStyle>
-            <a:lvl1pPr marL="0" indent="0" algn="ctr">
+            <a:lvl1pPr marL="0" indent="0" algn="l">
               <a:buNone/>
-              <a:defRPr sz="2400"/>
+              <a:defRPr sz="2400" cap="all" spc="200" baseline="0">
+                <a:solidFill>
+                  <a:schemeClr val="tx2"/>
+                </a:solidFill>
+                <a:latin typeface="+mj-lt"/>
+              </a:defRPr>
             </a:lvl1pPr>
             <a:lvl2pPr marL="457200" indent="0" algn="ctr">
               <a:buNone/>
-              <a:defRPr sz="2000"/>
+              <a:defRPr sz="2400"/>
             </a:lvl2pPr>
             <a:lvl3pPr marL="914400" indent="0" algn="ctr">
               <a:buNone/>
-              <a:defRPr sz="1800"/>
+              <a:defRPr sz="2400"/>
             </a:lvl3pPr>
             <a:lvl4pPr marL="1371600" indent="0" algn="ctr">
               <a:buNone/>
-              <a:defRPr sz="1600"/>
+              <a:defRPr sz="2000"/>
             </a:lvl4pPr>
             <a:lvl5pPr marL="1828800" indent="0" algn="ctr">
               <a:buNone/>
-              <a:defRPr sz="1600"/>
+              <a:defRPr sz="2000"/>
             </a:lvl5pPr>
             <a:lvl6pPr marL="2286000" indent="0" algn="ctr">
               <a:buNone/>
-              <a:defRPr sz="1600"/>
+              <a:defRPr sz="2000"/>
             </a:lvl6pPr>
             <a:lvl7pPr marL="2743200" indent="0" algn="ctr">
               <a:buNone/>
-              <a:defRPr sz="1600"/>
+              <a:defRPr sz="2000"/>
             </a:lvl7pPr>
             <a:lvl8pPr marL="3200400" indent="0" algn="ctr">
               <a:buNone/>
-              <a:defRPr sz="1600"/>
+              <a:defRPr sz="2000"/>
             </a:lvl8pPr>
             <a:lvl9pPr marL="3657600" indent="0" algn="ctr">
               <a:buNone/>
-              <a:defRPr sz="1600"/>
+              <a:defRPr sz="2000"/>
             </a:lvl9pPr>
           </a:lstStyle>
           <a:p>
@@ -2876,7 +2941,7 @@
               <a:rPr lang="en-US" smtClean="0"/>
               <a:t>Click to edit Master subtitle style</a:t>
             </a:r>
-            <a:endParaRPr lang="en-US"/>
+            <a:endParaRPr lang="en-US" dirty="0"/>
           </a:p>
         </p:txBody>
       </p:sp>
@@ -2897,7 +2962,7 @@
           <a:p>
             <a:fld id="{BBB629E2-F62A-44D5-B3F8-B590F085B231}" type="datetimeFigureOut">
               <a:rPr lang="en-US" smtClean="0"/>
-              <a:t>4/23/2019</a:t>
+              <a:t>4/24/2019</a:t>
             </a:fld>
             <a:endParaRPr lang="en-US"/>
           </a:p>
@@ -2945,16 +3010,66 @@
           </a:p>
         </p:txBody>
       </p:sp>
+      <p:cxnSp>
+        <p:nvCxnSpPr>
+          <p:cNvPr id="9" name="Straight Connector 8"/>
+          <p:cNvCxnSpPr/>
+          <p:nvPr/>
+        </p:nvCxnSpPr>
+        <p:spPr>
+          <a:xfrm>
+            <a:off x="1207658" y="4343400"/>
+            <a:ext cx="9875520" cy="0"/>
+          </a:xfrm>
+          <a:prstGeom prst="line">
+            <a:avLst/>
+          </a:prstGeom>
+          <a:ln w="6350">
+            <a:solidFill>
+              <a:schemeClr val="tx1">
+                <a:lumMod val="50000"/>
+                <a:lumOff val="50000"/>
+              </a:schemeClr>
+            </a:solidFill>
+          </a:ln>
+        </p:spPr>
+        <p:style>
+          <a:lnRef idx="1">
+            <a:schemeClr val="accent1"/>
+          </a:lnRef>
+          <a:fillRef idx="0">
+            <a:schemeClr val="accent1"/>
+          </a:fillRef>
+          <a:effectRef idx="0">
+            <a:schemeClr val="accent1"/>
+          </a:effectRef>
+          <a:fontRef idx="minor">
+            <a:schemeClr val="tx1"/>
+          </a:fontRef>
+        </p:style>
+      </p:cxnSp>
     </p:spTree>
     <p:extLst>
       <p:ext uri="{BB962C8B-B14F-4D97-AF65-F5344CB8AC3E}">
-        <p14:creationId xmlns:p14="http://schemas.microsoft.com/office/powerpoint/2010/main" val="1898558966"/>
+        <p14:creationId xmlns:p14="http://schemas.microsoft.com/office/powerpoint/2010/main" val="14052375"/>
       </p:ext>
     </p:extLst>
   </p:cSld>
   <p:clrMapOvr>
     <a:masterClrMapping/>
   </p:clrMapOvr>
+  <p:timing>
+    <p:tnLst>
+      <p:par>
+        <p:cTn id="1" dur="indefinite" restart="never" nodeType="tmRoot"/>
+      </p:par>
+    </p:tnLst>
+  </p:timing>
+  <p:extLst mod="1">
+    <p:ext uri="{DCECCB84-F9BA-43D5-87BE-67443E8EF086}">
+      <p15:sldGuideLst xmlns:p15="http://schemas.microsoft.com/office/powerpoint/2012/main"/>
+    </p:ext>
+  </p:extLst>
 </p:sldLayout>
 </file>
 
@@ -2994,7 +3109,7 @@
               <a:rPr lang="en-US" smtClean="0"/>
               <a:t>Click to edit Master title style</a:t>
             </a:r>
-            <a:endParaRPr lang="en-US"/>
+            <a:endParaRPr lang="en-US" dirty="0"/>
           </a:p>
         </p:txBody>
       </p:sp>
@@ -3010,7 +3125,7 @@
         </p:nvSpPr>
         <p:spPr/>
         <p:txBody>
-          <a:bodyPr vert="eaVert"/>
+          <a:bodyPr vert="eaVert" lIns="45720" tIns="0" rIns="45720" bIns="0"/>
           <a:lstStyle/>
           <a:p>
             <a:pPr lvl="0"/>
@@ -3046,7 +3161,7 @@
               <a:rPr lang="en-US" smtClean="0"/>
               <a:t>Fifth level</a:t>
             </a:r>
-            <a:endParaRPr lang="en-US"/>
+            <a:endParaRPr lang="en-US" dirty="0"/>
           </a:p>
         </p:txBody>
       </p:sp>
@@ -3067,7 +3182,7 @@
           <a:p>
             <a:fld id="{BBB629E2-F62A-44D5-B3F8-B590F085B231}" type="datetimeFigureOut">
               <a:rPr lang="en-US" smtClean="0"/>
-              <a:t>4/23/2019</a:t>
+              <a:t>4/24/2019</a:t>
             </a:fld>
             <a:endParaRPr lang="en-US"/>
           </a:p>
@@ -3118,7 +3233,7 @@
     </p:spTree>
     <p:extLst>
       <p:ext uri="{BB962C8B-B14F-4D97-AF65-F5344CB8AC3E}">
-        <p14:creationId xmlns:p14="http://schemas.microsoft.com/office/powerpoint/2010/main" val="2254630519"/>
+        <p14:creationId xmlns:p14="http://schemas.microsoft.com/office/powerpoint/2010/main" val="992987206"/>
       </p:ext>
     </p:extLst>
   </p:cSld>
@@ -3129,7 +3244,7 @@
 </file>
 
 <file path=ppt/slideLayouts/slideLayout11.xml><?xml version="1.0" encoding="utf-8"?>
-<p:sldLayout xmlns:a="http://schemas.openxmlformats.org/drawingml/2006/main" xmlns:r="http://schemas.openxmlformats.org/officeDocument/2006/relationships" xmlns:p="http://schemas.openxmlformats.org/presentationml/2006/main" type="vertTitleAndTx" preserve="1">
+<p:sldLayout xmlns:a="http://schemas.openxmlformats.org/drawingml/2006/main" xmlns:r="http://schemas.openxmlformats.org/officeDocument/2006/relationships" xmlns:p="http://schemas.openxmlformats.org/presentationml/2006/main" showMasterSp="0" type="vertTitleAndTx" preserve="1">
   <p:cSld name="Vertical Title and Text">
     <p:spTree>
       <p:nvGrpSpPr>
@@ -3147,6 +3262,82 @@
       </p:grpSpPr>
       <p:sp>
         <p:nvSpPr>
+          <p:cNvPr id="7" name="Rectangle 6"/>
+          <p:cNvSpPr/>
+          <p:nvPr/>
+        </p:nvSpPr>
+        <p:spPr>
+          <a:xfrm>
+            <a:off x="3175" y="6400800"/>
+            <a:ext cx="12188825" cy="457200"/>
+          </a:xfrm>
+          <a:prstGeom prst="rect">
+            <a:avLst/>
+          </a:prstGeom>
+          <a:solidFill>
+            <a:schemeClr val="accent2"/>
+          </a:solidFill>
+          <a:ln>
+            <a:noFill/>
+          </a:ln>
+        </p:spPr>
+        <p:style>
+          <a:lnRef idx="2">
+            <a:schemeClr val="accent1">
+              <a:shade val="50000"/>
+            </a:schemeClr>
+          </a:lnRef>
+          <a:fillRef idx="1">
+            <a:schemeClr val="accent1"/>
+          </a:fillRef>
+          <a:effectRef idx="0">
+            <a:schemeClr val="accent1"/>
+          </a:effectRef>
+          <a:fontRef idx="minor">
+            <a:schemeClr val="lt1"/>
+          </a:fontRef>
+        </p:style>
+      </p:sp>
+      <p:sp>
+        <p:nvSpPr>
+          <p:cNvPr id="8" name="Rectangle 7"/>
+          <p:cNvSpPr/>
+          <p:nvPr/>
+        </p:nvSpPr>
+        <p:spPr>
+          <a:xfrm>
+            <a:off x="15" y="6334316"/>
+            <a:ext cx="12188825" cy="64008"/>
+          </a:xfrm>
+          <a:prstGeom prst="rect">
+            <a:avLst/>
+          </a:prstGeom>
+          <a:solidFill>
+            <a:schemeClr val="accent1"/>
+          </a:solidFill>
+          <a:ln>
+            <a:noFill/>
+          </a:ln>
+        </p:spPr>
+        <p:style>
+          <a:lnRef idx="2">
+            <a:schemeClr val="accent1">
+              <a:shade val="50000"/>
+            </a:schemeClr>
+          </a:lnRef>
+          <a:fillRef idx="1">
+            <a:schemeClr val="accent1"/>
+          </a:fillRef>
+          <a:effectRef idx="0">
+            <a:schemeClr val="accent1"/>
+          </a:effectRef>
+          <a:fontRef idx="minor">
+            <a:schemeClr val="lt1"/>
+          </a:fontRef>
+        </p:style>
+      </p:sp>
+      <p:sp>
+        <p:nvSpPr>
           <p:cNvPr id="2" name="Vertical Title 1"/>
           <p:cNvSpPr>
             <a:spLocks noGrp="1"/>
@@ -3157,8 +3348,8 @@
         </p:nvSpPr>
         <p:spPr>
           <a:xfrm>
-            <a:off x="8724900" y="365125"/>
-            <a:ext cx="2628900" cy="5811838"/>
+            <a:off x="8724900" y="412302"/>
+            <a:ext cx="2628900" cy="5759898"/>
           </a:xfrm>
         </p:spPr>
         <p:txBody>
@@ -3169,7 +3360,7 @@
               <a:rPr lang="en-US" smtClean="0"/>
               <a:t>Click to edit Master title style</a:t>
             </a:r>
-            <a:endParaRPr lang="en-US"/>
+            <a:endParaRPr lang="en-US" dirty="0"/>
           </a:p>
         </p:txBody>
       </p:sp>
@@ -3185,12 +3376,12 @@
         </p:nvSpPr>
         <p:spPr>
           <a:xfrm>
-            <a:off x="838200" y="365125"/>
-            <a:ext cx="7734300" cy="5811838"/>
+            <a:off x="838200" y="412302"/>
+            <a:ext cx="7734300" cy="5759898"/>
           </a:xfrm>
         </p:spPr>
         <p:txBody>
-          <a:bodyPr vert="eaVert"/>
+          <a:bodyPr vert="eaVert" lIns="45720" tIns="0" rIns="45720" bIns="0"/>
           <a:lstStyle/>
           <a:p>
             <a:pPr lvl="0"/>
@@ -3226,7 +3417,7 @@
               <a:rPr lang="en-US" smtClean="0"/>
               <a:t>Fifth level</a:t>
             </a:r>
-            <a:endParaRPr lang="en-US"/>
+            <a:endParaRPr lang="en-US" dirty="0"/>
           </a:p>
         </p:txBody>
       </p:sp>
@@ -3247,7 +3438,7 @@
           <a:p>
             <a:fld id="{BBB629E2-F62A-44D5-B3F8-B590F085B231}" type="datetimeFigureOut">
               <a:rPr lang="en-US" smtClean="0"/>
-              <a:t>4/23/2019</a:t>
+              <a:t>4/24/2019</a:t>
             </a:fld>
             <a:endParaRPr lang="en-US"/>
           </a:p>
@@ -3298,18 +3489,23 @@
     </p:spTree>
     <p:extLst>
       <p:ext uri="{BB962C8B-B14F-4D97-AF65-F5344CB8AC3E}">
-        <p14:creationId xmlns:p14="http://schemas.microsoft.com/office/powerpoint/2010/main" val="556956650"/>
+        <p14:creationId xmlns:p14="http://schemas.microsoft.com/office/powerpoint/2010/main" val="595280773"/>
       </p:ext>
     </p:extLst>
   </p:cSld>
   <p:clrMapOvr>
     <a:masterClrMapping/>
   </p:clrMapOvr>
+  <p:extLst mod="1">
+    <p:ext uri="{DCECCB84-F9BA-43D5-87BE-67443E8EF086}">
+      <p15:sldGuideLst xmlns:p15="http://schemas.microsoft.com/office/powerpoint/2012/main"/>
+    </p:ext>
+  </p:extLst>
 </p:sldLayout>
 </file>
 
 <file path=ppt/slideLayouts/slideLayout2.xml><?xml version="1.0" encoding="utf-8"?>
-<p:sldLayout xmlns:a="http://schemas.openxmlformats.org/drawingml/2006/main" xmlns:r="http://schemas.openxmlformats.org/officeDocument/2006/relationships" xmlns:p="http://schemas.openxmlformats.org/presentationml/2006/main" type="obj" preserve="1">
+<p:sldLayout xmlns:a="http://schemas.openxmlformats.org/drawingml/2006/main" xmlns:r="http://schemas.openxmlformats.org/officeDocument/2006/relationships" xmlns:p="http://schemas.openxmlformats.org/presentationml/2006/main" preserve="1">
   <p:cSld name="Title and Content">
     <p:spTree>
       <p:nvGrpSpPr>
@@ -3344,59 +3540,7 @@
               <a:rPr lang="en-US" smtClean="0"/>
               <a:t>Click to edit Master title style</a:t>
             </a:r>
-            <a:endParaRPr lang="en-US"/>
-          </a:p>
-        </p:txBody>
-      </p:sp>
-      <p:sp>
-        <p:nvSpPr>
-          <p:cNvPr id="3" name="Content Placeholder 2"/>
-          <p:cNvSpPr>
-            <a:spLocks noGrp="1"/>
-          </p:cNvSpPr>
-          <p:nvPr>
-            <p:ph idx="1"/>
-          </p:nvPr>
-        </p:nvSpPr>
-        <p:spPr/>
-        <p:txBody>
-          <a:bodyPr/>
-          <a:lstStyle/>
-          <a:p>
-            <a:pPr lvl="0"/>
-            <a:r>
-              <a:rPr lang="en-US" smtClean="0"/>
-              <a:t>Click to edit Master text styles</a:t>
-            </a:r>
-          </a:p>
-          <a:p>
-            <a:pPr lvl="1"/>
-            <a:r>
-              <a:rPr lang="en-US" smtClean="0"/>
-              <a:t>Second level</a:t>
-            </a:r>
-          </a:p>
-          <a:p>
-            <a:pPr lvl="2"/>
-            <a:r>
-              <a:rPr lang="en-US" smtClean="0"/>
-              <a:t>Third level</a:t>
-            </a:r>
-          </a:p>
-          <a:p>
-            <a:pPr lvl="3"/>
-            <a:r>
-              <a:rPr lang="en-US" smtClean="0"/>
-              <a:t>Fourth level</a:t>
-            </a:r>
-          </a:p>
-          <a:p>
-            <a:pPr lvl="4"/>
-            <a:r>
-              <a:rPr lang="en-US" smtClean="0"/>
-              <a:t>Fifth level</a:t>
-            </a:r>
-            <a:endParaRPr lang="en-US"/>
+            <a:endParaRPr lang="en-US" dirty="0"/>
           </a:p>
         </p:txBody>
       </p:sp>
@@ -3417,7 +3561,7 @@
           <a:p>
             <a:fld id="{BBB629E2-F62A-44D5-B3F8-B590F085B231}" type="datetimeFigureOut">
               <a:rPr lang="en-US" smtClean="0"/>
-              <a:t>4/23/2019</a:t>
+              <a:t>4/24/2019</a:t>
             </a:fld>
             <a:endParaRPr lang="en-US"/>
           </a:p>
@@ -3465,22 +3609,115 @@
           </a:p>
         </p:txBody>
       </p:sp>
+      <p:sp>
+        <p:nvSpPr>
+          <p:cNvPr id="8" name="Text Placeholder 2"/>
+          <p:cNvSpPr>
+            <a:spLocks noGrp="1"/>
+          </p:cNvSpPr>
+          <p:nvPr>
+            <p:ph idx="1"/>
+          </p:nvPr>
+        </p:nvSpPr>
+        <p:spPr>
+          <a:xfrm>
+            <a:off x="1097280" y="1845734"/>
+            <a:ext cx="10058400" cy="4023360"/>
+          </a:xfrm>
+          <a:prstGeom prst="rect">
+            <a:avLst/>
+          </a:prstGeom>
+        </p:spPr>
+        <p:txBody>
+          <a:bodyPr vert="horz" lIns="0" tIns="45720" rIns="0" bIns="45720" rtlCol="0">
+            <a:normAutofit/>
+          </a:bodyPr>
+          <a:lstStyle/>
+          <a:p>
+            <a:pPr lvl="0"/>
+            <a:r>
+              <a:rPr lang="en-US" smtClean="0"/>
+              <a:t>Click to edit Master text styles</a:t>
+            </a:r>
+          </a:p>
+          <a:p>
+            <a:pPr lvl="1"/>
+            <a:r>
+              <a:rPr lang="en-US" smtClean="0"/>
+              <a:t>Second level</a:t>
+            </a:r>
+          </a:p>
+          <a:p>
+            <a:pPr lvl="2"/>
+            <a:r>
+              <a:rPr lang="en-US" smtClean="0"/>
+              <a:t>Third level</a:t>
+            </a:r>
+          </a:p>
+          <a:p>
+            <a:pPr lvl="3"/>
+            <a:r>
+              <a:rPr lang="en-US" smtClean="0"/>
+              <a:t>Fourth level</a:t>
+            </a:r>
+          </a:p>
+          <a:p>
+            <a:pPr lvl="4"/>
+            <a:r>
+              <a:rPr lang="en-US" smtClean="0"/>
+              <a:t>Fifth level</a:t>
+            </a:r>
+            <a:endParaRPr kumimoji="0" lang="en-US" sz="1400" b="0" i="0" u="none" strike="noStrike" kern="1200" cap="none" spc="0" normalizeH="0" baseline="0" noProof="0" dirty="0">
+              <a:ln>
+                <a:noFill/>
+              </a:ln>
+              <a:solidFill>
+                <a:prstClr val="black">
+                  <a:lumMod val="75000"/>
+                  <a:lumOff val="25000"/>
+                </a:prstClr>
+              </a:solidFill>
+              <a:effectLst/>
+              <a:uLnTx/>
+              <a:uFillTx/>
+              <a:latin typeface="+mn-lt"/>
+              <a:ea typeface="+mn-ea"/>
+              <a:cs typeface="+mn-cs"/>
+            </a:endParaRPr>
+          </a:p>
+        </p:txBody>
+      </p:sp>
     </p:spTree>
     <p:extLst>
       <p:ext uri="{BB962C8B-B14F-4D97-AF65-F5344CB8AC3E}">
-        <p14:creationId xmlns:p14="http://schemas.microsoft.com/office/powerpoint/2010/main" val="732415408"/>
+        <p14:creationId xmlns:p14="http://schemas.microsoft.com/office/powerpoint/2010/main" val="2072896401"/>
       </p:ext>
     </p:extLst>
   </p:cSld>
   <p:clrMapOvr>
     <a:masterClrMapping/>
   </p:clrMapOvr>
+  <p:timing>
+    <p:tnLst>
+      <p:par>
+        <p:cTn id="1" dur="indefinite" restart="never" nodeType="tmRoot"/>
+      </p:par>
+    </p:tnLst>
+  </p:timing>
 </p:sldLayout>
 </file>
 
 <file path=ppt/slideLayouts/slideLayout3.xml><?xml version="1.0" encoding="utf-8"?>
-<p:sldLayout xmlns:a="http://schemas.openxmlformats.org/drawingml/2006/main" xmlns:r="http://schemas.openxmlformats.org/officeDocument/2006/relationships" xmlns:p="http://schemas.openxmlformats.org/presentationml/2006/main" type="secHead" preserve="1">
+<p:sldLayout xmlns:a="http://schemas.openxmlformats.org/drawingml/2006/main" xmlns:r="http://schemas.openxmlformats.org/officeDocument/2006/relationships" xmlns:p="http://schemas.openxmlformats.org/presentationml/2006/main" showMasterSp="0" type="secHead" preserve="1">
   <p:cSld name="Section Header">
+    <p:bg>
+      <p:bgPr>
+        <a:solidFill>
+          <a:schemeClr val="bg1"/>
+        </a:solidFill>
+        <a:effectLst/>
+      </p:bgPr>
+    </p:bg>
     <p:spTree>
       <p:nvGrpSpPr>
         <p:cNvPr id="1" name=""/>
@@ -3495,6 +3732,52 @@
           <a:chExt cx="0" cy="0"/>
         </a:xfrm>
       </p:grpSpPr>
+      <p:pic>
+        <p:nvPicPr>
+          <p:cNvPr id="10" name="Picture 6" descr="Related image"/>
+          <p:cNvPicPr>
+            <a:picLocks noChangeAspect="1" noChangeArrowheads="1"/>
+          </p:cNvPicPr>
+          <p:nvPr/>
+        </p:nvPicPr>
+        <p:blipFill rotWithShape="1">
+          <a:blip r:embed="rId2">
+            <a:duotone>
+              <a:schemeClr val="accent1">
+                <a:shade val="45000"/>
+                <a:satMod val="135000"/>
+              </a:schemeClr>
+              <a:prstClr val="white"/>
+            </a:duotone>
+            <a:extLst>
+              <a:ext uri="{28A0092B-C50C-407E-A947-70E740481C1C}">
+                <a14:useLocalDpi xmlns:a14="http://schemas.microsoft.com/office/drawing/2010/main" val="0"/>
+              </a:ext>
+            </a:extLst>
+          </a:blip>
+          <a:srcRect b="67027"/>
+          <a:stretch/>
+        </p:blipFill>
+        <p:spPr bwMode="auto">
+          <a:xfrm>
+            <a:off x="1587" y="5791200"/>
+            <a:ext cx="12190413" cy="1066800"/>
+          </a:xfrm>
+          <a:prstGeom prst="rect">
+            <a:avLst/>
+          </a:prstGeom>
+          <a:noFill/>
+          <a:extLst>
+            <a:ext uri="{909E8E84-426E-40DD-AFC4-6F175D3DCCD1}">
+              <a14:hiddenFill xmlns:a14="http://schemas.microsoft.com/office/drawing/2010/main">
+                <a:solidFill>
+                  <a:srgbClr val="FFFFFF"/>
+                </a:solidFill>
+              </a14:hiddenFill>
+            </a:ext>
+          </a:extLst>
+        </p:spPr>
+      </p:pic>
       <p:sp>
         <p:nvSpPr>
           <p:cNvPr id="2" name="Title 1"/>
@@ -3507,15 +3790,27 @@
         </p:nvSpPr>
         <p:spPr>
           <a:xfrm>
-            <a:off x="831850" y="1709738"/>
-            <a:ext cx="10515600" cy="2852737"/>
+            <a:off x="1097280" y="758952"/>
+            <a:ext cx="10058400" cy="3566160"/>
           </a:xfrm>
         </p:spPr>
         <p:txBody>
-          <a:bodyPr anchor="b"/>
+          <a:bodyPr anchor="b" anchorCtr="0">
+            <a:normAutofit/>
+          </a:bodyPr>
           <a:lstStyle>
             <a:lvl1pPr>
-              <a:defRPr sz="6000"/>
+              <a:lnSpc>
+                <a:spcPct val="85000"/>
+              </a:lnSpc>
+              <a:defRPr sz="8000" b="0">
+                <a:solidFill>
+                  <a:schemeClr val="tx1">
+                    <a:lumMod val="85000"/>
+                    <a:lumOff val="15000"/>
+                  </a:schemeClr>
+                </a:solidFill>
+              </a:defRPr>
             </a:lvl1pPr>
           </a:lstStyle>
           <a:p>
@@ -3523,7 +3818,7 @@
               <a:rPr lang="en-US" smtClean="0"/>
               <a:t>Click to edit Master title style</a:t>
             </a:r>
-            <a:endParaRPr lang="en-US"/>
+            <a:endParaRPr lang="en-US" dirty="0"/>
           </a:p>
         </p:txBody>
       </p:sp>
@@ -3539,26 +3834,27 @@
         </p:nvSpPr>
         <p:spPr>
           <a:xfrm>
-            <a:off x="831850" y="4589463"/>
-            <a:ext cx="10515600" cy="1500187"/>
+            <a:off x="1097280" y="4453128"/>
+            <a:ext cx="10058400" cy="1143000"/>
           </a:xfrm>
         </p:spPr>
         <p:txBody>
-          <a:bodyPr/>
+          <a:bodyPr lIns="91440" rIns="91440" anchor="t" anchorCtr="0">
+            <a:normAutofit/>
+          </a:bodyPr>
           <a:lstStyle>
             <a:lvl1pPr marL="0" indent="0">
               <a:buNone/>
-              <a:defRPr sz="2400">
+              <a:defRPr sz="2400" cap="all" spc="200" baseline="0">
                 <a:solidFill>
-                  <a:schemeClr val="tx1">
-                    <a:tint val="75000"/>
-                  </a:schemeClr>
+                  <a:schemeClr val="tx2"/>
                 </a:solidFill>
+                <a:latin typeface="+mj-lt"/>
               </a:defRPr>
             </a:lvl1pPr>
             <a:lvl2pPr marL="457200" indent="0">
               <a:buNone/>
-              <a:defRPr sz="2000">
+              <a:defRPr sz="1800">
                 <a:solidFill>
                   <a:schemeClr val="tx1">
                     <a:tint val="75000"/>
@@ -3568,7 +3864,7 @@
             </a:lvl2pPr>
             <a:lvl3pPr marL="914400" indent="0">
               <a:buNone/>
-              <a:defRPr sz="1800">
+              <a:defRPr sz="1600">
                 <a:solidFill>
                   <a:schemeClr val="tx1">
                     <a:tint val="75000"/>
@@ -3578,7 +3874,7 @@
             </a:lvl3pPr>
             <a:lvl4pPr marL="1371600" indent="0">
               <a:buNone/>
-              <a:defRPr sz="1600">
+              <a:defRPr sz="1400">
                 <a:solidFill>
                   <a:schemeClr val="tx1">
                     <a:tint val="75000"/>
@@ -3588,7 +3884,7 @@
             </a:lvl4pPr>
             <a:lvl5pPr marL="1828800" indent="0">
               <a:buNone/>
-              <a:defRPr sz="1600">
+              <a:defRPr sz="1400">
                 <a:solidFill>
                   <a:schemeClr val="tx1">
                     <a:tint val="75000"/>
@@ -3598,7 +3894,7 @@
             </a:lvl5pPr>
             <a:lvl6pPr marL="2286000" indent="0">
               <a:buNone/>
-              <a:defRPr sz="1600">
+              <a:defRPr sz="1400">
                 <a:solidFill>
                   <a:schemeClr val="tx1">
                     <a:tint val="75000"/>
@@ -3608,7 +3904,7 @@
             </a:lvl6pPr>
             <a:lvl7pPr marL="2743200" indent="0">
               <a:buNone/>
-              <a:defRPr sz="1600">
+              <a:defRPr sz="1400">
                 <a:solidFill>
                   <a:schemeClr val="tx1">
                     <a:tint val="75000"/>
@@ -3618,7 +3914,7 @@
             </a:lvl7pPr>
             <a:lvl8pPr marL="3200400" indent="0">
               <a:buNone/>
-              <a:defRPr sz="1600">
+              <a:defRPr sz="1400">
                 <a:solidFill>
                   <a:schemeClr val="tx1">
                     <a:tint val="75000"/>
@@ -3628,7 +3924,7 @@
             </a:lvl8pPr>
             <a:lvl9pPr marL="3657600" indent="0">
               <a:buNone/>
-              <a:defRPr sz="1600">
+              <a:defRPr sz="1400">
                 <a:solidFill>
                   <a:schemeClr val="tx1">
                     <a:tint val="75000"/>
@@ -3663,7 +3959,7 @@
           <a:p>
             <a:fld id="{BBB629E2-F62A-44D5-B3F8-B590F085B231}" type="datetimeFigureOut">
               <a:rPr lang="en-US" smtClean="0"/>
-              <a:t>4/23/2019</a:t>
+              <a:t>4/24/2019</a:t>
             </a:fld>
             <a:endParaRPr lang="en-US"/>
           </a:p>
@@ -3711,16 +4007,66 @@
           </a:p>
         </p:txBody>
       </p:sp>
+      <p:cxnSp>
+        <p:nvCxnSpPr>
+          <p:cNvPr id="9" name="Straight Connector 8"/>
+          <p:cNvCxnSpPr/>
+          <p:nvPr/>
+        </p:nvCxnSpPr>
+        <p:spPr>
+          <a:xfrm>
+            <a:off x="1207658" y="4343400"/>
+            <a:ext cx="9875520" cy="0"/>
+          </a:xfrm>
+          <a:prstGeom prst="line">
+            <a:avLst/>
+          </a:prstGeom>
+          <a:ln w="6350">
+            <a:solidFill>
+              <a:schemeClr val="tx1">
+                <a:lumMod val="50000"/>
+                <a:lumOff val="50000"/>
+              </a:schemeClr>
+            </a:solidFill>
+          </a:ln>
+        </p:spPr>
+        <p:style>
+          <a:lnRef idx="1">
+            <a:schemeClr val="accent1"/>
+          </a:lnRef>
+          <a:fillRef idx="0">
+            <a:schemeClr val="accent1"/>
+          </a:fillRef>
+          <a:effectRef idx="0">
+            <a:schemeClr val="accent1"/>
+          </a:effectRef>
+          <a:fontRef idx="minor">
+            <a:schemeClr val="tx1"/>
+          </a:fontRef>
+        </p:style>
+      </p:cxnSp>
     </p:spTree>
     <p:extLst>
       <p:ext uri="{BB962C8B-B14F-4D97-AF65-F5344CB8AC3E}">
-        <p14:creationId xmlns:p14="http://schemas.microsoft.com/office/powerpoint/2010/main" val="524221767"/>
+        <p14:creationId xmlns:p14="http://schemas.microsoft.com/office/powerpoint/2010/main" val="3720649772"/>
       </p:ext>
     </p:extLst>
   </p:cSld>
   <p:clrMapOvr>
     <a:masterClrMapping/>
   </p:clrMapOvr>
+  <p:timing>
+    <p:tnLst>
+      <p:par>
+        <p:cTn id="1" dur="indefinite" restart="never" nodeType="tmRoot"/>
+      </p:par>
+    </p:tnLst>
+  </p:timing>
+  <p:extLst mod="1">
+    <p:ext uri="{DCECCB84-F9BA-43D5-87BE-67443E8EF086}">
+      <p15:sldGuideLst xmlns:p15="http://schemas.microsoft.com/office/powerpoint/2012/main"/>
+    </p:ext>
+  </p:extLst>
 </p:sldLayout>
 </file>
 
@@ -3743,7 +4089,7 @@
       </p:grpSpPr>
       <p:sp>
         <p:nvSpPr>
-          <p:cNvPr id="2" name="Title 1"/>
+          <p:cNvPr id="8" name="Title 7"/>
           <p:cNvSpPr>
             <a:spLocks noGrp="1"/>
           </p:cNvSpPr>
@@ -3751,7 +4097,12 @@
             <p:ph type="title"/>
           </p:nvPr>
         </p:nvSpPr>
-        <p:spPr/>
+        <p:spPr>
+          <a:xfrm>
+            <a:off x="1097280" y="286603"/>
+            <a:ext cx="10058400" cy="1450757"/>
+          </a:xfrm>
+        </p:spPr>
         <p:txBody>
           <a:bodyPr/>
           <a:lstStyle/>
@@ -3760,7 +4111,7 @@
               <a:rPr lang="en-US" smtClean="0"/>
               <a:t>Click to edit Master title style</a:t>
             </a:r>
-            <a:endParaRPr lang="en-US"/>
+            <a:endParaRPr lang="en-US" dirty="0"/>
           </a:p>
         </p:txBody>
       </p:sp>
@@ -3776,8 +4127,8 @@
         </p:nvSpPr>
         <p:spPr>
           <a:xfrm>
-            <a:off x="838200" y="1825625"/>
-            <a:ext cx="5181600" cy="4351338"/>
+            <a:off x="1097280" y="1845734"/>
+            <a:ext cx="4937760" cy="4023359"/>
           </a:xfrm>
         </p:spPr>
         <p:txBody>
@@ -3817,7 +4168,7 @@
               <a:rPr lang="en-US" smtClean="0"/>
               <a:t>Fifth level</a:t>
             </a:r>
-            <a:endParaRPr lang="en-US"/>
+            <a:endParaRPr lang="en-US" dirty="0"/>
           </a:p>
         </p:txBody>
       </p:sp>
@@ -3833,8 +4184,8 @@
         </p:nvSpPr>
         <p:spPr>
           <a:xfrm>
-            <a:off x="6172200" y="1825625"/>
-            <a:ext cx="5181600" cy="4351338"/>
+            <a:off x="6217920" y="1845735"/>
+            <a:ext cx="4937760" cy="4023360"/>
           </a:xfrm>
         </p:spPr>
         <p:txBody>
@@ -3874,7 +4225,7 @@
               <a:rPr lang="en-US" smtClean="0"/>
               <a:t>Fifth level</a:t>
             </a:r>
-            <a:endParaRPr lang="en-US"/>
+            <a:endParaRPr lang="en-US" dirty="0"/>
           </a:p>
         </p:txBody>
       </p:sp>
@@ -3895,7 +4246,7 @@
           <a:p>
             <a:fld id="{BBB629E2-F62A-44D5-B3F8-B590F085B231}" type="datetimeFigureOut">
               <a:rPr lang="en-US" smtClean="0"/>
-              <a:t>4/23/2019</a:t>
+              <a:t>4/24/2019</a:t>
             </a:fld>
             <a:endParaRPr lang="en-US"/>
           </a:p>
@@ -3946,13 +4297,20 @@
     </p:spTree>
     <p:extLst>
       <p:ext uri="{BB962C8B-B14F-4D97-AF65-F5344CB8AC3E}">
-        <p14:creationId xmlns:p14="http://schemas.microsoft.com/office/powerpoint/2010/main" val="550873239"/>
+        <p14:creationId xmlns:p14="http://schemas.microsoft.com/office/powerpoint/2010/main" val="2060185314"/>
       </p:ext>
     </p:extLst>
   </p:cSld>
   <p:clrMapOvr>
     <a:masterClrMapping/>
   </p:clrMapOvr>
+  <p:timing>
+    <p:tnLst>
+      <p:par>
+        <p:cTn id="1" dur="indefinite" restart="never" nodeType="tmRoot"/>
+      </p:par>
+    </p:tnLst>
+  </p:timing>
 </p:sldLayout>
 </file>
 
@@ -3975,7 +4333,7 @@
       </p:grpSpPr>
       <p:sp>
         <p:nvSpPr>
-          <p:cNvPr id="2" name="Title 1"/>
+          <p:cNvPr id="10" name="Title 9"/>
           <p:cNvSpPr>
             <a:spLocks noGrp="1"/>
           </p:cNvSpPr>
@@ -3985,8 +4343,8 @@
         </p:nvSpPr>
         <p:spPr>
           <a:xfrm>
-            <a:off x="839788" y="365125"/>
-            <a:ext cx="10515600" cy="1325563"/>
+            <a:off x="1097280" y="286603"/>
+            <a:ext cx="10058400" cy="1450757"/>
           </a:xfrm>
         </p:spPr>
         <p:txBody>
@@ -3997,7 +4355,7 @@
               <a:rPr lang="en-US" smtClean="0"/>
               <a:t>Click to edit Master title style</a:t>
             </a:r>
-            <a:endParaRPr lang="en-US"/>
+            <a:endParaRPr lang="en-US" dirty="0"/>
           </a:p>
         </p:txBody>
       </p:sp>
@@ -4013,16 +4371,22 @@
         </p:nvSpPr>
         <p:spPr>
           <a:xfrm>
-            <a:off x="839788" y="1681163"/>
-            <a:ext cx="5157787" cy="823912"/>
+            <a:off x="1097280" y="1846052"/>
+            <a:ext cx="4937760" cy="736282"/>
           </a:xfrm>
         </p:spPr>
         <p:txBody>
-          <a:bodyPr anchor="b"/>
+          <a:bodyPr lIns="91440" rIns="91440" anchor="ctr">
+            <a:normAutofit/>
+          </a:bodyPr>
           <a:lstStyle>
             <a:lvl1pPr marL="0" indent="0">
               <a:buNone/>
-              <a:defRPr sz="2400" b="1"/>
+              <a:defRPr sz="2000" b="0" cap="all" baseline="0">
+                <a:solidFill>
+                  <a:schemeClr val="tx2"/>
+                </a:solidFill>
+              </a:defRPr>
             </a:lvl1pPr>
             <a:lvl2pPr marL="457200" indent="0">
               <a:buNone/>
@@ -4078,8 +4442,8 @@
         </p:nvSpPr>
         <p:spPr>
           <a:xfrm>
-            <a:off x="839788" y="2505075"/>
-            <a:ext cx="5157787" cy="3684588"/>
+            <a:off x="1097280" y="2582335"/>
+            <a:ext cx="4937760" cy="3286760"/>
           </a:xfrm>
         </p:spPr>
         <p:txBody>
@@ -4119,7 +4483,7 @@
               <a:rPr lang="en-US" smtClean="0"/>
               <a:t>Fifth level</a:t>
             </a:r>
-            <a:endParaRPr lang="en-US"/>
+            <a:endParaRPr lang="en-US" dirty="0"/>
           </a:p>
         </p:txBody>
       </p:sp>
@@ -4135,16 +4499,22 @@
         </p:nvSpPr>
         <p:spPr>
           <a:xfrm>
-            <a:off x="6172200" y="1681163"/>
-            <a:ext cx="5183188" cy="823912"/>
+            <a:off x="6217920" y="1846052"/>
+            <a:ext cx="4937760" cy="736282"/>
           </a:xfrm>
         </p:spPr>
         <p:txBody>
-          <a:bodyPr anchor="b"/>
+          <a:bodyPr lIns="91440" rIns="91440" anchor="ctr">
+            <a:normAutofit/>
+          </a:bodyPr>
           <a:lstStyle>
             <a:lvl1pPr marL="0" indent="0">
               <a:buNone/>
-              <a:defRPr sz="2400" b="1"/>
+              <a:defRPr sz="2000" b="0" cap="all" baseline="0">
+                <a:solidFill>
+                  <a:schemeClr val="tx2"/>
+                </a:solidFill>
+              </a:defRPr>
             </a:lvl1pPr>
             <a:lvl2pPr marL="457200" indent="0">
               <a:buNone/>
@@ -4200,8 +4570,8 @@
         </p:nvSpPr>
         <p:spPr>
           <a:xfrm>
-            <a:off x="6172200" y="2505075"/>
-            <a:ext cx="5183188" cy="3684588"/>
+            <a:off x="6217920" y="2582334"/>
+            <a:ext cx="4937760" cy="3286760"/>
           </a:xfrm>
         </p:spPr>
         <p:txBody>
@@ -4241,7 +4611,7 @@
               <a:rPr lang="en-US" smtClean="0"/>
               <a:t>Fifth level</a:t>
             </a:r>
-            <a:endParaRPr lang="en-US"/>
+            <a:endParaRPr lang="en-US" dirty="0"/>
           </a:p>
         </p:txBody>
       </p:sp>
@@ -4262,7 +4632,7 @@
           <a:p>
             <a:fld id="{BBB629E2-F62A-44D5-B3F8-B590F085B231}" type="datetimeFigureOut">
               <a:rPr lang="en-US" smtClean="0"/>
-              <a:t>4/23/2019</a:t>
+              <a:t>4/24/2019</a:t>
             </a:fld>
             <a:endParaRPr lang="en-US"/>
           </a:p>
@@ -4313,18 +4683,25 @@
     </p:spTree>
     <p:extLst>
       <p:ext uri="{BB962C8B-B14F-4D97-AF65-F5344CB8AC3E}">
-        <p14:creationId xmlns:p14="http://schemas.microsoft.com/office/powerpoint/2010/main" val="3501493136"/>
+        <p14:creationId xmlns:p14="http://schemas.microsoft.com/office/powerpoint/2010/main" val="1644289673"/>
       </p:ext>
     </p:extLst>
   </p:cSld>
   <p:clrMapOvr>
     <a:masterClrMapping/>
   </p:clrMapOvr>
+  <p:timing>
+    <p:tnLst>
+      <p:par>
+        <p:cTn id="1" dur="indefinite" restart="never" nodeType="tmRoot"/>
+      </p:par>
+    </p:tnLst>
+  </p:timing>
 </p:sldLayout>
 </file>
 
 <file path=ppt/slideLayouts/slideLayout6.xml><?xml version="1.0" encoding="utf-8"?>
-<p:sldLayout xmlns:a="http://schemas.openxmlformats.org/drawingml/2006/main" xmlns:r="http://schemas.openxmlformats.org/officeDocument/2006/relationships" xmlns:p="http://schemas.openxmlformats.org/presentationml/2006/main" type="titleOnly" preserve="1">
+<p:sldLayout xmlns:a="http://schemas.openxmlformats.org/drawingml/2006/main" xmlns:r="http://schemas.openxmlformats.org/officeDocument/2006/relationships" xmlns:p="http://schemas.openxmlformats.org/presentationml/2006/main" preserve="1">
   <p:cSld name="Title Only">
     <p:spTree>
       <p:nvGrpSpPr>
@@ -4359,7 +4736,7 @@
               <a:rPr lang="en-US" smtClean="0"/>
               <a:t>Click to edit Master title style</a:t>
             </a:r>
-            <a:endParaRPr lang="en-US"/>
+            <a:endParaRPr lang="en-US" dirty="0"/>
           </a:p>
         </p:txBody>
       </p:sp>
@@ -4380,7 +4757,7 @@
           <a:p>
             <a:fld id="{BBB629E2-F62A-44D5-B3F8-B590F085B231}" type="datetimeFigureOut">
               <a:rPr lang="en-US" smtClean="0"/>
-              <a:t>4/23/2019</a:t>
+              <a:t>4/24/2019</a:t>
             </a:fld>
             <a:endParaRPr lang="en-US"/>
           </a:p>
@@ -4428,21 +4805,106 @@
           </a:p>
         </p:txBody>
       </p:sp>
+      <p:sp>
+        <p:nvSpPr>
+          <p:cNvPr id="7" name="Text Placeholder 2"/>
+          <p:cNvSpPr>
+            <a:spLocks noGrp="1"/>
+          </p:cNvSpPr>
+          <p:nvPr>
+            <p:ph idx="1"/>
+          </p:nvPr>
+        </p:nvSpPr>
+        <p:spPr>
+          <a:xfrm>
+            <a:off x="1097280" y="1845734"/>
+            <a:ext cx="10058400" cy="4023360"/>
+          </a:xfrm>
+          <a:prstGeom prst="rect">
+            <a:avLst/>
+          </a:prstGeom>
+        </p:spPr>
+        <p:txBody>
+          <a:bodyPr vert="horz" lIns="0" tIns="45720" rIns="0" bIns="45720" rtlCol="0">
+            <a:normAutofit/>
+          </a:bodyPr>
+          <a:lstStyle/>
+          <a:p>
+            <a:pPr lvl="0"/>
+            <a:r>
+              <a:rPr lang="en-US" smtClean="0"/>
+              <a:t>Click to edit Master text styles</a:t>
+            </a:r>
+          </a:p>
+          <a:p>
+            <a:pPr lvl="1"/>
+            <a:r>
+              <a:rPr lang="en-US" smtClean="0"/>
+              <a:t>Second level</a:t>
+            </a:r>
+          </a:p>
+          <a:p>
+            <a:pPr lvl="2"/>
+            <a:r>
+              <a:rPr lang="en-US" smtClean="0"/>
+              <a:t>Third level</a:t>
+            </a:r>
+          </a:p>
+          <a:p>
+            <a:pPr lvl="3"/>
+            <a:r>
+              <a:rPr lang="en-US" smtClean="0"/>
+              <a:t>Fourth level</a:t>
+            </a:r>
+          </a:p>
+          <a:p>
+            <a:pPr lvl="4"/>
+            <a:r>
+              <a:rPr lang="en-US" smtClean="0"/>
+              <a:t>Fifth level</a:t>
+            </a:r>
+            <a:endParaRPr kumimoji="0" lang="en-US" sz="1400" b="0" i="0" u="none" strike="noStrike" kern="1200" cap="none" spc="0" normalizeH="0" baseline="0" noProof="0" dirty="0">
+              <a:ln>
+                <a:noFill/>
+              </a:ln>
+              <a:solidFill>
+                <a:prstClr val="black">
+                  <a:lumMod val="75000"/>
+                  <a:lumOff val="25000"/>
+                </a:prstClr>
+              </a:solidFill>
+              <a:effectLst/>
+              <a:uLnTx/>
+              <a:uFillTx/>
+              <a:latin typeface="+mn-lt"/>
+              <a:ea typeface="+mn-ea"/>
+              <a:cs typeface="+mn-cs"/>
+            </a:endParaRPr>
+          </a:p>
+        </p:txBody>
+      </p:sp>
     </p:spTree>
     <p:extLst>
       <p:ext uri="{BB962C8B-B14F-4D97-AF65-F5344CB8AC3E}">
-        <p14:creationId xmlns:p14="http://schemas.microsoft.com/office/powerpoint/2010/main" val="3623974295"/>
+        <p14:creationId xmlns:p14="http://schemas.microsoft.com/office/powerpoint/2010/main" val="1459421798"/>
       </p:ext>
     </p:extLst>
   </p:cSld>
   <p:clrMapOvr>
     <a:masterClrMapping/>
   </p:clrMapOvr>
+  <p:timing>
+    <p:tnLst>
+      <p:par>
+        <p:cTn id="1" dur="indefinite" restart="never" nodeType="tmRoot"/>
+      </p:par>
+    </p:tnLst>
+  </p:timing>
 </p:sldLayout>
 </file>
 
 <file path=ppt/slideLayouts/slideLayout7.xml><?xml version="1.0" encoding="utf-8"?>
-<p:sldLayout xmlns:a="http://schemas.openxmlformats.org/drawingml/2006/main" xmlns:r="http://schemas.openxmlformats.org/officeDocument/2006/relationships" xmlns:p="http://schemas.openxmlformats.org/presentationml/2006/main" type="blank" preserve="1">
+<p:sldLayout xmlns:a="http://schemas.openxmlformats.org/drawingml/2006/main" xmlns:r="http://schemas.openxmlformats.org/officeDocument/2006/relationships" xmlns:p="http://schemas.openxmlformats.org/presentationml/2006/main" showMasterSp="0" type="blank" preserve="1">
   <p:cSld name="Blank">
     <p:spTree>
       <p:nvGrpSpPr>
@@ -4460,7 +4922,7 @@
       </p:grpSpPr>
       <p:sp>
         <p:nvSpPr>
-          <p:cNvPr id="2" name="Date Placeholder 1"/>
+          <p:cNvPr id="7" name="Date Placeholder 6"/>
           <p:cNvSpPr>
             <a:spLocks noGrp="1"/>
           </p:cNvSpPr>
@@ -4475,7 +4937,7 @@
           <a:p>
             <a:fld id="{BBB629E2-F62A-44D5-B3F8-B590F085B231}" type="datetimeFigureOut">
               <a:rPr lang="en-US" smtClean="0"/>
-              <a:t>4/23/2019</a:t>
+              <a:t>4/24/2019</a:t>
             </a:fld>
             <a:endParaRPr lang="en-US"/>
           </a:p>
@@ -4483,7 +4945,7 @@
       </p:sp>
       <p:sp>
         <p:nvSpPr>
-          <p:cNvPr id="3" name="Footer Placeholder 2"/>
+          <p:cNvPr id="8" name="Footer Placeholder 7"/>
           <p:cNvSpPr>
             <a:spLocks noGrp="1"/>
           </p:cNvSpPr>
@@ -4494,7 +4956,15 @@
         <p:spPr/>
         <p:txBody>
           <a:bodyPr/>
-          <a:lstStyle/>
+          <a:lstStyle>
+            <a:lvl1pPr>
+              <a:defRPr>
+                <a:solidFill>
+                  <a:srgbClr val="FFFFFF"/>
+                </a:solidFill>
+              </a:defRPr>
+            </a:lvl1pPr>
+          </a:lstStyle>
           <a:p>
             <a:endParaRPr lang="en-US"/>
           </a:p>
@@ -4502,7 +4972,7 @@
       </p:sp>
       <p:sp>
         <p:nvSpPr>
-          <p:cNvPr id="4" name="Slide Number Placeholder 3"/>
+          <p:cNvPr id="9" name="Slide Number Placeholder 8"/>
           <p:cNvSpPr>
             <a:spLocks noGrp="1"/>
           </p:cNvSpPr>
@@ -4523,21 +4993,74 @@
           </a:p>
         </p:txBody>
       </p:sp>
+      <p:pic>
+        <p:nvPicPr>
+          <p:cNvPr id="10" name="Picture 6" descr="Related image"/>
+          <p:cNvPicPr>
+            <a:picLocks noChangeAspect="1" noChangeArrowheads="1"/>
+          </p:cNvPicPr>
+          <p:nvPr/>
+        </p:nvPicPr>
+        <p:blipFill rotWithShape="1">
+          <a:blip r:embed="rId2">
+            <a:duotone>
+              <a:schemeClr val="accent1">
+                <a:shade val="45000"/>
+                <a:satMod val="135000"/>
+              </a:schemeClr>
+              <a:prstClr val="white"/>
+            </a:duotone>
+            <a:extLst>
+              <a:ext uri="{28A0092B-C50C-407E-A947-70E740481C1C}">
+                <a14:useLocalDpi xmlns:a14="http://schemas.microsoft.com/office/drawing/2010/main" val="0"/>
+              </a:ext>
+            </a:extLst>
+          </a:blip>
+          <a:srcRect b="67027"/>
+          <a:stretch/>
+        </p:blipFill>
+        <p:spPr bwMode="auto">
+          <a:xfrm>
+            <a:off x="1587" y="5791200"/>
+            <a:ext cx="12190413" cy="1066800"/>
+          </a:xfrm>
+          <a:prstGeom prst="rect">
+            <a:avLst/>
+          </a:prstGeom>
+          <a:noFill/>
+          <a:extLst>
+            <a:ext uri="{909E8E84-426E-40DD-AFC4-6F175D3DCCD1}">
+              <a14:hiddenFill xmlns:a14="http://schemas.microsoft.com/office/drawing/2010/main">
+                <a:solidFill>
+                  <a:srgbClr val="FFFFFF"/>
+                </a:solidFill>
+              </a14:hiddenFill>
+            </a:ext>
+          </a:extLst>
+        </p:spPr>
+      </p:pic>
     </p:spTree>
     <p:extLst>
       <p:ext uri="{BB962C8B-B14F-4D97-AF65-F5344CB8AC3E}">
-        <p14:creationId xmlns:p14="http://schemas.microsoft.com/office/powerpoint/2010/main" val="2975823501"/>
+        <p14:creationId xmlns:p14="http://schemas.microsoft.com/office/powerpoint/2010/main" val="4238029847"/>
       </p:ext>
     </p:extLst>
   </p:cSld>
   <p:clrMapOvr>
     <a:masterClrMapping/>
   </p:clrMapOvr>
+  <p:timing>
+    <p:tnLst>
+      <p:par>
+        <p:cTn id="1" dur="indefinite" restart="never" nodeType="tmRoot"/>
+      </p:par>
+    </p:tnLst>
+  </p:timing>
 </p:sldLayout>
 </file>
 
 <file path=ppt/slideLayouts/slideLayout8.xml><?xml version="1.0" encoding="utf-8"?>
-<p:sldLayout xmlns:a="http://schemas.openxmlformats.org/drawingml/2006/main" xmlns:r="http://schemas.openxmlformats.org/officeDocument/2006/relationships" xmlns:p="http://schemas.openxmlformats.org/presentationml/2006/main" type="objTx" preserve="1">
+<p:sldLayout xmlns:a="http://schemas.openxmlformats.org/drawingml/2006/main" xmlns:r="http://schemas.openxmlformats.org/officeDocument/2006/relationships" xmlns:p="http://schemas.openxmlformats.org/presentationml/2006/main" showMasterSp="0" type="objTx" preserve="1">
   <p:cSld name="Content with Caption">
     <p:spTree>
       <p:nvGrpSpPr>
@@ -4555,6 +5078,82 @@
       </p:grpSpPr>
       <p:sp>
         <p:nvSpPr>
+          <p:cNvPr id="8" name="Rectangle 7"/>
+          <p:cNvSpPr/>
+          <p:nvPr/>
+        </p:nvSpPr>
+        <p:spPr>
+          <a:xfrm>
+            <a:off x="16" y="0"/>
+            <a:ext cx="4050791" cy="6858000"/>
+          </a:xfrm>
+          <a:prstGeom prst="rect">
+            <a:avLst/>
+          </a:prstGeom>
+          <a:solidFill>
+            <a:schemeClr val="accent2"/>
+          </a:solidFill>
+          <a:ln>
+            <a:noFill/>
+          </a:ln>
+        </p:spPr>
+        <p:style>
+          <a:lnRef idx="2">
+            <a:schemeClr val="accent1">
+              <a:shade val="50000"/>
+            </a:schemeClr>
+          </a:lnRef>
+          <a:fillRef idx="1">
+            <a:schemeClr val="accent1"/>
+          </a:fillRef>
+          <a:effectRef idx="0">
+            <a:schemeClr val="accent1"/>
+          </a:effectRef>
+          <a:fontRef idx="minor">
+            <a:schemeClr val="lt1"/>
+          </a:fontRef>
+        </p:style>
+      </p:sp>
+      <p:sp>
+        <p:nvSpPr>
+          <p:cNvPr id="9" name="Rectangle 8"/>
+          <p:cNvSpPr/>
+          <p:nvPr/>
+        </p:nvSpPr>
+        <p:spPr>
+          <a:xfrm>
+            <a:off x="4040071" y="0"/>
+            <a:ext cx="64008" cy="6858000"/>
+          </a:xfrm>
+          <a:prstGeom prst="rect">
+            <a:avLst/>
+          </a:prstGeom>
+          <a:solidFill>
+            <a:schemeClr val="accent1"/>
+          </a:solidFill>
+          <a:ln>
+            <a:noFill/>
+          </a:ln>
+        </p:spPr>
+        <p:style>
+          <a:lnRef idx="2">
+            <a:schemeClr val="accent1">
+              <a:shade val="50000"/>
+            </a:schemeClr>
+          </a:lnRef>
+          <a:fillRef idx="1">
+            <a:schemeClr val="accent1"/>
+          </a:fillRef>
+          <a:effectRef idx="0">
+            <a:schemeClr val="accent1"/>
+          </a:effectRef>
+          <a:fontRef idx="minor">
+            <a:schemeClr val="lt1"/>
+          </a:fontRef>
+        </p:style>
+      </p:sp>
+      <p:sp>
+        <p:nvSpPr>
           <p:cNvPr id="2" name="Title 1"/>
           <p:cNvSpPr>
             <a:spLocks noGrp="1"/>
@@ -4565,15 +5164,21 @@
         </p:nvSpPr>
         <p:spPr>
           <a:xfrm>
-            <a:off x="839788" y="457200"/>
-            <a:ext cx="3932237" cy="1600200"/>
+            <a:off x="457200" y="594359"/>
+            <a:ext cx="3200400" cy="2286000"/>
           </a:xfrm>
         </p:spPr>
         <p:txBody>
-          <a:bodyPr anchor="b"/>
+          <a:bodyPr anchor="b">
+            <a:normAutofit/>
+          </a:bodyPr>
           <a:lstStyle>
             <a:lvl1pPr>
-              <a:defRPr sz="3200"/>
+              <a:defRPr sz="3600" b="0">
+                <a:solidFill>
+                  <a:srgbClr val="FFFFFF"/>
+                </a:solidFill>
+              </a:defRPr>
             </a:lvl1pPr>
           </a:lstStyle>
           <a:p>
@@ -4581,7 +5186,7 @@
               <a:rPr lang="en-US" smtClean="0"/>
               <a:t>Click to edit Master title style</a:t>
             </a:r>
-            <a:endParaRPr lang="en-US"/>
+            <a:endParaRPr lang="en-US" dirty="0"/>
           </a:p>
         </p:txBody>
       </p:sp>
@@ -4597,41 +5202,13 @@
         </p:nvSpPr>
         <p:spPr>
           <a:xfrm>
-            <a:off x="5183188" y="987425"/>
-            <a:ext cx="6172200" cy="4873625"/>
+            <a:off x="4800600" y="731520"/>
+            <a:ext cx="6492240" cy="5257800"/>
           </a:xfrm>
         </p:spPr>
         <p:txBody>
           <a:bodyPr/>
-          <a:lstStyle>
-            <a:lvl1pPr>
-              <a:defRPr sz="3200"/>
-            </a:lvl1pPr>
-            <a:lvl2pPr>
-              <a:defRPr sz="2800"/>
-            </a:lvl2pPr>
-            <a:lvl3pPr>
-              <a:defRPr sz="2400"/>
-            </a:lvl3pPr>
-            <a:lvl4pPr>
-              <a:defRPr sz="2000"/>
-            </a:lvl4pPr>
-            <a:lvl5pPr>
-              <a:defRPr sz="2000"/>
-            </a:lvl5pPr>
-            <a:lvl6pPr>
-              <a:defRPr sz="2000"/>
-            </a:lvl6pPr>
-            <a:lvl7pPr>
-              <a:defRPr sz="2000"/>
-            </a:lvl7pPr>
-            <a:lvl8pPr>
-              <a:defRPr sz="2000"/>
-            </a:lvl8pPr>
-            <a:lvl9pPr>
-              <a:defRPr sz="2000"/>
-            </a:lvl9pPr>
-          </a:lstStyle>
+          <a:lstStyle/>
           <a:p>
             <a:pPr lvl="0"/>
             <a:r>
@@ -4666,7 +5243,7 @@
               <a:rPr lang="en-US" smtClean="0"/>
               <a:t>Fifth level</a:t>
             </a:r>
-            <a:endParaRPr lang="en-US"/>
+            <a:endParaRPr lang="en-US" dirty="0"/>
           </a:p>
         </p:txBody>
       </p:sp>
@@ -4682,48 +5259,54 @@
         </p:nvSpPr>
         <p:spPr>
           <a:xfrm>
-            <a:off x="839788" y="2057400"/>
-            <a:ext cx="3932237" cy="3811588"/>
+            <a:off x="457200" y="2926080"/>
+            <a:ext cx="3200400" cy="3379124"/>
           </a:xfrm>
         </p:spPr>
         <p:txBody>
-          <a:bodyPr/>
+          <a:bodyPr lIns="91440" rIns="91440">
+            <a:normAutofit/>
+          </a:bodyPr>
           <a:lstStyle>
             <a:lvl1pPr marL="0" indent="0">
               <a:buNone/>
-              <a:defRPr sz="1600"/>
+              <a:defRPr sz="1500">
+                <a:solidFill>
+                  <a:srgbClr val="FFFFFF"/>
+                </a:solidFill>
+              </a:defRPr>
             </a:lvl1pPr>
             <a:lvl2pPr marL="457200" indent="0">
               <a:buNone/>
-              <a:defRPr sz="1400"/>
+              <a:defRPr sz="1200"/>
             </a:lvl2pPr>
             <a:lvl3pPr marL="914400" indent="0">
               <a:buNone/>
-              <a:defRPr sz="1200"/>
+              <a:defRPr sz="1000"/>
             </a:lvl3pPr>
             <a:lvl4pPr marL="1371600" indent="0">
               <a:buNone/>
-              <a:defRPr sz="1000"/>
+              <a:defRPr sz="900"/>
             </a:lvl4pPr>
             <a:lvl5pPr marL="1828800" indent="0">
               <a:buNone/>
-              <a:defRPr sz="1000"/>
+              <a:defRPr sz="900"/>
             </a:lvl5pPr>
             <a:lvl6pPr marL="2286000" indent="0">
               <a:buNone/>
-              <a:defRPr sz="1000"/>
+              <a:defRPr sz="900"/>
             </a:lvl6pPr>
             <a:lvl7pPr marL="2743200" indent="0">
               <a:buNone/>
-              <a:defRPr sz="1000"/>
+              <a:defRPr sz="900"/>
             </a:lvl7pPr>
             <a:lvl8pPr marL="3200400" indent="0">
               <a:buNone/>
-              <a:defRPr sz="1000"/>
+              <a:defRPr sz="900"/>
             </a:lvl8pPr>
             <a:lvl9pPr marL="3657600" indent="0">
               <a:buNone/>
-              <a:defRPr sz="1000"/>
+              <a:defRPr sz="900"/>
             </a:lvl9pPr>
           </a:lstStyle>
           <a:p>
@@ -4745,14 +5328,23 @@
             <p:ph type="dt" sz="half" idx="10"/>
           </p:nvPr>
         </p:nvSpPr>
-        <p:spPr/>
+        <p:spPr>
+          <a:xfrm>
+            <a:off x="465512" y="6459785"/>
+            <a:ext cx="2618510" cy="365125"/>
+          </a:xfrm>
+        </p:spPr>
         <p:txBody>
           <a:bodyPr/>
-          <a:lstStyle/>
+          <a:lstStyle>
+            <a:lvl1pPr algn="l">
+              <a:defRPr/>
+            </a:lvl1pPr>
+          </a:lstStyle>
           <a:p>
             <a:fld id="{BBB629E2-F62A-44D5-B3F8-B590F085B231}" type="datetimeFigureOut">
               <a:rPr lang="en-US" smtClean="0"/>
-              <a:t>4/23/2019</a:t>
+              <a:t>4/24/2019</a:t>
             </a:fld>
             <a:endParaRPr lang="en-US"/>
           </a:p>
@@ -4768,10 +5360,23 @@
             <p:ph type="ftr" sz="quarter" idx="11"/>
           </p:nvPr>
         </p:nvSpPr>
-        <p:spPr/>
+        <p:spPr>
+          <a:xfrm>
+            <a:off x="4800600" y="6459785"/>
+            <a:ext cx="4648200" cy="365125"/>
+          </a:xfrm>
+        </p:spPr>
         <p:txBody>
           <a:bodyPr/>
-          <a:lstStyle/>
+          <a:lstStyle>
+            <a:lvl1pPr algn="l">
+              <a:defRPr>
+                <a:solidFill>
+                  <a:schemeClr val="tx2"/>
+                </a:solidFill>
+              </a:defRPr>
+            </a:lvl1pPr>
+          </a:lstStyle>
           <a:p>
             <a:endParaRPr lang="en-US"/>
           </a:p>
@@ -4790,7 +5395,15 @@
         <p:spPr/>
         <p:txBody>
           <a:bodyPr/>
-          <a:lstStyle/>
+          <a:lstStyle>
+            <a:lvl1pPr>
+              <a:defRPr>
+                <a:solidFill>
+                  <a:schemeClr val="tx2"/>
+                </a:solidFill>
+              </a:defRPr>
+            </a:lvl1pPr>
+          </a:lstStyle>
           <a:p>
             <a:fld id="{E76DDA1A-84DD-4193-A3ED-9F6A9490CB06}" type="slidenum">
               <a:rPr lang="en-US" smtClean="0"/>
@@ -4803,7 +5416,7 @@
     </p:spTree>
     <p:extLst>
       <p:ext uri="{BB962C8B-B14F-4D97-AF65-F5344CB8AC3E}">
-        <p14:creationId xmlns:p14="http://schemas.microsoft.com/office/powerpoint/2010/main" val="589249874"/>
+        <p14:creationId xmlns:p14="http://schemas.microsoft.com/office/powerpoint/2010/main" val="3265394782"/>
       </p:ext>
     </p:extLst>
   </p:cSld>
@@ -4814,7 +5427,7 @@
 </file>
 
 <file path=ppt/slideLayouts/slideLayout9.xml><?xml version="1.0" encoding="utf-8"?>
-<p:sldLayout xmlns:a="http://schemas.openxmlformats.org/drawingml/2006/main" xmlns:r="http://schemas.openxmlformats.org/officeDocument/2006/relationships" xmlns:p="http://schemas.openxmlformats.org/presentationml/2006/main" type="picTx" preserve="1">
+<p:sldLayout xmlns:a="http://schemas.openxmlformats.org/drawingml/2006/main" xmlns:r="http://schemas.openxmlformats.org/officeDocument/2006/relationships" xmlns:p="http://schemas.openxmlformats.org/presentationml/2006/main" showMasterSp="0" type="picTx" preserve="1">
   <p:cSld name="Picture with Caption">
     <p:spTree>
       <p:nvGrpSpPr>
@@ -4832,6 +5445,82 @@
       </p:grpSpPr>
       <p:sp>
         <p:nvSpPr>
+          <p:cNvPr id="8" name="Rectangle 7"/>
+          <p:cNvSpPr/>
+          <p:nvPr/>
+        </p:nvSpPr>
+        <p:spPr>
+          <a:xfrm>
+            <a:off x="0" y="4953000"/>
+            <a:ext cx="12188825" cy="1905000"/>
+          </a:xfrm>
+          <a:prstGeom prst="rect">
+            <a:avLst/>
+          </a:prstGeom>
+          <a:solidFill>
+            <a:schemeClr val="accent2"/>
+          </a:solidFill>
+          <a:ln>
+            <a:noFill/>
+          </a:ln>
+        </p:spPr>
+        <p:style>
+          <a:lnRef idx="2">
+            <a:schemeClr val="accent1">
+              <a:shade val="50000"/>
+            </a:schemeClr>
+          </a:lnRef>
+          <a:fillRef idx="1">
+            <a:schemeClr val="accent1"/>
+          </a:fillRef>
+          <a:effectRef idx="0">
+            <a:schemeClr val="accent1"/>
+          </a:effectRef>
+          <a:fontRef idx="minor">
+            <a:schemeClr val="lt1"/>
+          </a:fontRef>
+        </p:style>
+      </p:sp>
+      <p:sp>
+        <p:nvSpPr>
+          <p:cNvPr id="9" name="Rectangle 8"/>
+          <p:cNvSpPr/>
+          <p:nvPr/>
+        </p:nvSpPr>
+        <p:spPr>
+          <a:xfrm>
+            <a:off x="15" y="4915076"/>
+            <a:ext cx="12188825" cy="64008"/>
+          </a:xfrm>
+          <a:prstGeom prst="rect">
+            <a:avLst/>
+          </a:prstGeom>
+          <a:solidFill>
+            <a:schemeClr val="accent1"/>
+          </a:solidFill>
+          <a:ln>
+            <a:noFill/>
+          </a:ln>
+        </p:spPr>
+        <p:style>
+          <a:lnRef idx="2">
+            <a:schemeClr val="accent1">
+              <a:shade val="50000"/>
+            </a:schemeClr>
+          </a:lnRef>
+          <a:fillRef idx="1">
+            <a:schemeClr val="accent1"/>
+          </a:fillRef>
+          <a:effectRef idx="0">
+            <a:schemeClr val="accent1"/>
+          </a:effectRef>
+          <a:fontRef idx="minor">
+            <a:schemeClr val="lt1"/>
+          </a:fontRef>
+        </p:style>
+      </p:sp>
+      <p:sp>
+        <p:nvSpPr>
           <p:cNvPr id="2" name="Title 1"/>
           <p:cNvSpPr>
             <a:spLocks noGrp="1"/>
@@ -4842,15 +5531,21 @@
         </p:nvSpPr>
         <p:spPr>
           <a:xfrm>
-            <a:off x="839788" y="457200"/>
-            <a:ext cx="3932237" cy="1600200"/>
+            <a:off x="1097280" y="5074920"/>
+            <a:ext cx="10113645" cy="822960"/>
           </a:xfrm>
         </p:spPr>
         <p:txBody>
-          <a:bodyPr anchor="b"/>
+          <a:bodyPr tIns="0" bIns="0" anchor="b">
+            <a:noAutofit/>
+          </a:bodyPr>
           <a:lstStyle>
             <a:lvl1pPr>
-              <a:defRPr sz="3200"/>
+              <a:defRPr sz="3600" b="0">
+                <a:solidFill>
+                  <a:srgbClr val="FFFFFF"/>
+                </a:solidFill>
+              </a:defRPr>
             </a:lvl1pPr>
           </a:lstStyle>
           <a:p>
@@ -4858,7 +5553,7 @@
               <a:rPr lang="en-US" smtClean="0"/>
               <a:t>Click to edit Master title style</a:t>
             </a:r>
-            <a:endParaRPr lang="en-US"/>
+            <a:endParaRPr lang="en-US" dirty="0"/>
           </a:p>
         </p:txBody>
       </p:sp>
@@ -4866,7 +5561,7 @@
         <p:nvSpPr>
           <p:cNvPr id="3" name="Picture Placeholder 2"/>
           <p:cNvSpPr>
-            <a:spLocks noGrp="1"/>
+            <a:spLocks noGrp="1" noChangeAspect="1"/>
           </p:cNvSpPr>
           <p:nvPr>
             <p:ph type="pic" idx="1"/>
@@ -4874,12 +5569,17 @@
         </p:nvSpPr>
         <p:spPr>
           <a:xfrm>
-            <a:off x="5183188" y="987425"/>
-            <a:ext cx="6172200" cy="4873625"/>
+            <a:off x="15" y="0"/>
+            <a:ext cx="12191985" cy="4915076"/>
           </a:xfrm>
+          <a:solidFill>
+            <a:schemeClr val="bg2">
+              <a:lumMod val="90000"/>
+            </a:schemeClr>
+          </a:solidFill>
         </p:spPr>
         <p:txBody>
-          <a:bodyPr/>
+          <a:bodyPr lIns="457200" tIns="457200" anchor="t"/>
           <a:lstStyle>
             <a:lvl1pPr marL="0" indent="0">
               <a:buNone/>
@@ -4919,7 +5619,11 @@
             </a:lvl9pPr>
           </a:lstStyle>
           <a:p>
-            <a:endParaRPr lang="en-US"/>
+            <a:r>
+              <a:rPr lang="en-US" smtClean="0"/>
+              <a:t>Click icon to add picture</a:t>
+            </a:r>
+            <a:endParaRPr lang="en-US" dirty="0"/>
           </a:p>
         </p:txBody>
       </p:sp>
@@ -4935,48 +5639,60 @@
         </p:nvSpPr>
         <p:spPr>
           <a:xfrm>
-            <a:off x="839788" y="2057400"/>
-            <a:ext cx="3932237" cy="3811588"/>
+            <a:off x="1097280" y="5907024"/>
+            <a:ext cx="10113264" cy="594360"/>
           </a:xfrm>
         </p:spPr>
         <p:txBody>
-          <a:bodyPr/>
+          <a:bodyPr lIns="91440" tIns="0" rIns="91440" bIns="0">
+            <a:normAutofit/>
+          </a:bodyPr>
           <a:lstStyle>
             <a:lvl1pPr marL="0" indent="0">
+              <a:spcBef>
+                <a:spcPts val="0"/>
+              </a:spcBef>
+              <a:spcAft>
+                <a:spcPts val="600"/>
+              </a:spcAft>
               <a:buNone/>
-              <a:defRPr sz="1600"/>
+              <a:defRPr sz="1500">
+                <a:solidFill>
+                  <a:srgbClr val="FFFFFF"/>
+                </a:solidFill>
+              </a:defRPr>
             </a:lvl1pPr>
             <a:lvl2pPr marL="457200" indent="0">
               <a:buNone/>
-              <a:defRPr sz="1400"/>
+              <a:defRPr sz="1200"/>
             </a:lvl2pPr>
             <a:lvl3pPr marL="914400" indent="0">
               <a:buNone/>
-              <a:defRPr sz="1200"/>
+              <a:defRPr sz="1000"/>
             </a:lvl3pPr>
             <a:lvl4pPr marL="1371600" indent="0">
               <a:buNone/>
-              <a:defRPr sz="1000"/>
+              <a:defRPr sz="900"/>
             </a:lvl4pPr>
             <a:lvl5pPr marL="1828800" indent="0">
               <a:buNone/>
-              <a:defRPr sz="1000"/>
+              <a:defRPr sz="900"/>
             </a:lvl5pPr>
             <a:lvl6pPr marL="2286000" indent="0">
               <a:buNone/>
-              <a:defRPr sz="1000"/>
+              <a:defRPr sz="900"/>
             </a:lvl6pPr>
             <a:lvl7pPr marL="2743200" indent="0">
               <a:buNone/>
-              <a:defRPr sz="1000"/>
+              <a:defRPr sz="900"/>
             </a:lvl7pPr>
             <a:lvl8pPr marL="3200400" indent="0">
               <a:buNone/>
-              <a:defRPr sz="1000"/>
+              <a:defRPr sz="900"/>
             </a:lvl8pPr>
             <a:lvl9pPr marL="3657600" indent="0">
               <a:buNone/>
-              <a:defRPr sz="1000"/>
+              <a:defRPr sz="900"/>
             </a:lvl9pPr>
           </a:lstStyle>
           <a:p>
@@ -5005,7 +5721,7 @@
           <a:p>
             <a:fld id="{BBB629E2-F62A-44D5-B3F8-B590F085B231}" type="datetimeFigureOut">
               <a:rPr lang="en-US" smtClean="0"/>
-              <a:t>4/23/2019</a:t>
+              <a:t>4/24/2019</a:t>
             </a:fld>
             <a:endParaRPr lang="en-US"/>
           </a:p>
@@ -5056,7 +5772,7 @@
     </p:spTree>
     <p:extLst>
       <p:ext uri="{BB962C8B-B14F-4D97-AF65-F5344CB8AC3E}">
-        <p14:creationId xmlns:p14="http://schemas.microsoft.com/office/powerpoint/2010/main" val="2194679795"/>
+        <p14:creationId xmlns:p14="http://schemas.microsoft.com/office/powerpoint/2010/main" val="316116530"/>
       </p:ext>
     </p:extLst>
   </p:cSld>
@@ -5088,6 +5804,52 @@
           <a:chExt cx="0" cy="0"/>
         </a:xfrm>
       </p:grpSpPr>
+      <p:pic>
+        <p:nvPicPr>
+          <p:cNvPr id="11" name="Picture 6" descr="Related image"/>
+          <p:cNvPicPr>
+            <a:picLocks noChangeAspect="1" noChangeArrowheads="1"/>
+          </p:cNvPicPr>
+          <p:nvPr/>
+        </p:nvPicPr>
+        <p:blipFill rotWithShape="1">
+          <a:blip r:embed="rId13">
+            <a:duotone>
+              <a:schemeClr val="accent1">
+                <a:shade val="45000"/>
+                <a:satMod val="135000"/>
+              </a:schemeClr>
+              <a:prstClr val="white"/>
+            </a:duotone>
+            <a:extLst>
+              <a:ext uri="{28A0092B-C50C-407E-A947-70E740481C1C}">
+                <a14:useLocalDpi xmlns:a14="http://schemas.microsoft.com/office/drawing/2010/main" val="0"/>
+              </a:ext>
+            </a:extLst>
+          </a:blip>
+          <a:srcRect b="67027"/>
+          <a:stretch/>
+        </p:blipFill>
+        <p:spPr bwMode="auto">
+          <a:xfrm>
+            <a:off x="1587" y="5791200"/>
+            <a:ext cx="12190413" cy="1066800"/>
+          </a:xfrm>
+          <a:prstGeom prst="rect">
+            <a:avLst/>
+          </a:prstGeom>
+          <a:noFill/>
+          <a:extLst>
+            <a:ext uri="{909E8E84-426E-40DD-AFC4-6F175D3DCCD1}">
+              <a14:hiddenFill xmlns:a14="http://schemas.microsoft.com/office/drawing/2010/main">
+                <a:solidFill>
+                  <a:srgbClr val="FFFFFF"/>
+                </a:solidFill>
+              </a14:hiddenFill>
+            </a:ext>
+          </a:extLst>
+        </p:spPr>
+      </p:pic>
       <p:sp>
         <p:nvSpPr>
           <p:cNvPr id="2" name="Title Placeholder 1"/>
@@ -5100,15 +5862,15 @@
         </p:nvSpPr>
         <p:spPr>
           <a:xfrm>
-            <a:off x="838200" y="365125"/>
-            <a:ext cx="10515600" cy="1325563"/>
+            <a:off x="1097280" y="286603"/>
+            <a:ext cx="10058400" cy="1450757"/>
           </a:xfrm>
           <a:prstGeom prst="rect">
             <a:avLst/>
           </a:prstGeom>
         </p:spPr>
         <p:txBody>
-          <a:bodyPr vert="horz" lIns="91440" tIns="45720" rIns="91440" bIns="45720" rtlCol="0" anchor="ctr">
+          <a:bodyPr vert="horz" lIns="91440" tIns="45720" rIns="91440" bIns="45720" rtlCol="0" anchor="b">
             <a:normAutofit/>
           </a:bodyPr>
           <a:lstStyle/>
@@ -5117,7 +5879,7 @@
               <a:rPr lang="en-US" smtClean="0"/>
               <a:t>Click to edit Master title style</a:t>
             </a:r>
-            <a:endParaRPr lang="en-US"/>
+            <a:endParaRPr lang="en-US" dirty="0"/>
           </a:p>
         </p:txBody>
       </p:sp>
@@ -5133,53 +5895,90 @@
         </p:nvSpPr>
         <p:spPr>
           <a:xfrm>
-            <a:off x="838200" y="1825625"/>
-            <a:ext cx="10515600" cy="4351338"/>
+            <a:off x="1097280" y="1845734"/>
+            <a:ext cx="10058400" cy="4023360"/>
           </a:xfrm>
           <a:prstGeom prst="rect">
             <a:avLst/>
           </a:prstGeom>
         </p:spPr>
         <p:txBody>
-          <a:bodyPr vert="horz" lIns="91440" tIns="45720" rIns="91440" bIns="45720" rtlCol="0">
+          <a:bodyPr vert="horz" lIns="0" tIns="45720" rIns="0" bIns="45720" rtlCol="0">
             <a:normAutofit/>
           </a:bodyPr>
           <a:lstStyle/>
           <a:p>
             <a:pPr lvl="0"/>
             <a:r>
-              <a:rPr lang="en-US" smtClean="0"/>
-              <a:t>Click to edit Master text styles</a:t>
+              <a:rPr lang="en-US" dirty="0" smtClean="0"/>
+              <a:t>Edit Master text styles</a:t>
             </a:r>
           </a:p>
           <a:p>
             <a:pPr lvl="1"/>
             <a:r>
-              <a:rPr lang="en-US" smtClean="0"/>
+              <a:rPr lang="en-US" dirty="0" smtClean="0"/>
               <a:t>Second level</a:t>
             </a:r>
           </a:p>
           <a:p>
             <a:pPr lvl="2"/>
             <a:r>
-              <a:rPr lang="en-US" smtClean="0"/>
+              <a:rPr lang="en-US" dirty="0" smtClean="0"/>
               <a:t>Third level</a:t>
             </a:r>
           </a:p>
           <a:p>
             <a:pPr lvl="3"/>
             <a:r>
-              <a:rPr lang="en-US" smtClean="0"/>
+              <a:rPr lang="en-US" dirty="0" smtClean="0"/>
               <a:t>Fourth level</a:t>
             </a:r>
           </a:p>
           <a:p>
             <a:pPr lvl="4"/>
             <a:r>
-              <a:rPr lang="en-US" smtClean="0"/>
+              <a:rPr lang="en-US" dirty="0" smtClean="0"/>
               <a:t>Fifth level</a:t>
             </a:r>
-            <a:endParaRPr lang="en-US"/>
+          </a:p>
+          <a:p>
+            <a:pPr marL="91440" marR="0" lvl="0" indent="-91440" algn="l" defTabSz="914400" rtl="0" eaLnBrk="1" fontAlgn="auto" latinLnBrk="0" hangingPunct="1">
+              <a:lnSpc>
+                <a:spcPct val="90000"/>
+              </a:lnSpc>
+              <a:spcBef>
+                <a:spcPts val="1200"/>
+              </a:spcBef>
+              <a:spcAft>
+                <a:spcPts val="200"/>
+              </a:spcAft>
+              <a:buClr>
+                <a:srgbClr val="1CADE4"/>
+              </a:buClr>
+              <a:buSzPct val="100000"/>
+              <a:buFont typeface="Calibri" panose="020F0502020204030204" pitchFamily="34" charset="0"/>
+              <a:buChar char=" "/>
+              <a:tabLst/>
+              <a:defRPr/>
+            </a:pPr>
+            <a:endParaRPr kumimoji="0" lang="en-US" sz="1400" b="0" i="0" u="none" strike="noStrike" kern="1200" cap="none" spc="0" normalizeH="0" baseline="0" noProof="0" dirty="0">
+              <a:ln>
+                <a:noFill/>
+              </a:ln>
+              <a:solidFill>
+                <a:prstClr val="black">
+                  <a:lumMod val="75000"/>
+                  <a:lumOff val="25000"/>
+                </a:prstClr>
+              </a:solidFill>
+              <a:effectLst/>
+              <a:uLnTx/>
+              <a:uFillTx/>
+              <a:latin typeface="+mn-lt"/>
+              <a:ea typeface="+mn-ea"/>
+              <a:cs typeface="+mn-cs"/>
+            </a:endParaRPr>
           </a:p>
         </p:txBody>
       </p:sp>
@@ -5195,8 +5994,8 @@
         </p:nvSpPr>
         <p:spPr>
           <a:xfrm>
-            <a:off x="838200" y="6356350"/>
-            <a:ext cx="2743200" cy="365125"/>
+            <a:off x="1097280" y="6459785"/>
+            <a:ext cx="2472271" cy="365125"/>
           </a:xfrm>
           <a:prstGeom prst="rect">
             <a:avLst/>
@@ -5206,11 +6005,9 @@
           <a:bodyPr vert="horz" lIns="91440" tIns="45720" rIns="91440" bIns="45720" rtlCol="0" anchor="ctr"/>
           <a:lstStyle>
             <a:lvl1pPr algn="l">
-              <a:defRPr sz="1200">
+              <a:defRPr sz="900">
                 <a:solidFill>
-                  <a:schemeClr val="tx1">
-                    <a:tint val="75000"/>
-                  </a:schemeClr>
+                  <a:srgbClr val="FFFFFF"/>
                 </a:solidFill>
               </a:defRPr>
             </a:lvl1pPr>
@@ -5218,7 +6015,7 @@
           <a:p>
             <a:fld id="{BBB629E2-F62A-44D5-B3F8-B590F085B231}" type="datetimeFigureOut">
               <a:rPr lang="en-US" smtClean="0"/>
-              <a:t>4/23/2019</a:t>
+              <a:t>4/24/2019</a:t>
             </a:fld>
             <a:endParaRPr lang="en-US"/>
           </a:p>
@@ -5236,8 +6033,8 @@
         </p:nvSpPr>
         <p:spPr>
           <a:xfrm>
-            <a:off x="4038600" y="6356350"/>
-            <a:ext cx="4114800" cy="365125"/>
+            <a:off x="3686185" y="6459785"/>
+            <a:ext cx="4822804" cy="365125"/>
           </a:xfrm>
           <a:prstGeom prst="rect">
             <a:avLst/>
@@ -5247,11 +6044,9 @@
           <a:bodyPr vert="horz" lIns="91440" tIns="45720" rIns="91440" bIns="45720" rtlCol="0" anchor="ctr"/>
           <a:lstStyle>
             <a:lvl1pPr algn="ctr">
-              <a:defRPr sz="1200">
+              <a:defRPr sz="900" cap="all" baseline="0">
                 <a:solidFill>
-                  <a:schemeClr val="tx1">
-                    <a:tint val="75000"/>
-                  </a:schemeClr>
+                  <a:srgbClr val="FFFFFF"/>
                 </a:solidFill>
               </a:defRPr>
             </a:lvl1pPr>
@@ -5273,8 +6068,8 @@
         </p:nvSpPr>
         <p:spPr>
           <a:xfrm>
-            <a:off x="8610600" y="6356350"/>
-            <a:ext cx="2743200" cy="365125"/>
+            <a:off x="9900458" y="6459785"/>
+            <a:ext cx="1312025" cy="365125"/>
           </a:xfrm>
           <a:prstGeom prst="rect">
             <a:avLst/>
@@ -5284,11 +6079,9 @@
           <a:bodyPr vert="horz" lIns="91440" tIns="45720" rIns="91440" bIns="45720" rtlCol="0" anchor="ctr"/>
           <a:lstStyle>
             <a:lvl1pPr algn="r">
-              <a:defRPr sz="1200">
+              <a:defRPr sz="1050">
                 <a:solidFill>
-                  <a:schemeClr val="tx1">
-                    <a:tint val="75000"/>
-                  </a:schemeClr>
+                  <a:srgbClr val="FFFFFF"/>
                 </a:solidFill>
               </a:defRPr>
             </a:lvl1pPr>
@@ -5302,40 +6095,88 @@
           </a:p>
         </p:txBody>
       </p:sp>
+      <p:cxnSp>
+        <p:nvCxnSpPr>
+          <p:cNvPr id="10" name="Straight Connector 9"/>
+          <p:cNvCxnSpPr/>
+          <p:nvPr/>
+        </p:nvCxnSpPr>
+        <p:spPr>
+          <a:xfrm>
+            <a:off x="1193532" y="1737845"/>
+            <a:ext cx="9966960" cy="0"/>
+          </a:xfrm>
+          <a:prstGeom prst="line">
+            <a:avLst/>
+          </a:prstGeom>
+          <a:ln w="6350">
+            <a:solidFill>
+              <a:schemeClr val="tx1">
+                <a:lumMod val="50000"/>
+                <a:lumOff val="50000"/>
+              </a:schemeClr>
+            </a:solidFill>
+          </a:ln>
+        </p:spPr>
+        <p:style>
+          <a:lnRef idx="1">
+            <a:schemeClr val="accent1"/>
+          </a:lnRef>
+          <a:fillRef idx="0">
+            <a:schemeClr val="accent1"/>
+          </a:fillRef>
+          <a:effectRef idx="0">
+            <a:schemeClr val="accent1"/>
+          </a:effectRef>
+          <a:fontRef idx="minor">
+            <a:schemeClr val="tx1"/>
+          </a:fontRef>
+        </p:style>
+      </p:cxnSp>
     </p:spTree>
     <p:extLst>
       <p:ext uri="{BB962C8B-B14F-4D97-AF65-F5344CB8AC3E}">
-        <p14:creationId xmlns:p14="http://schemas.microsoft.com/office/powerpoint/2010/main" val="1584937233"/>
+        <p14:creationId xmlns:p14="http://schemas.microsoft.com/office/powerpoint/2010/main" val="3926009699"/>
       </p:ext>
     </p:extLst>
   </p:cSld>
   <p:clrMap bg1="lt1" tx1="dk1" bg2="lt2" tx2="dk2" accent1="accent1" accent2="accent2" accent3="accent3" accent4="accent4" accent5="accent5" accent6="accent6" hlink="hlink" folHlink="folHlink"/>
   <p:sldLayoutIdLst>
-    <p:sldLayoutId id="2147483649" r:id="rId1"/>
-    <p:sldLayoutId id="2147483650" r:id="rId2"/>
-    <p:sldLayoutId id="2147483651" r:id="rId3"/>
-    <p:sldLayoutId id="2147483652" r:id="rId4"/>
-    <p:sldLayoutId id="2147483653" r:id="rId5"/>
-    <p:sldLayoutId id="2147483654" r:id="rId6"/>
-    <p:sldLayoutId id="2147483655" r:id="rId7"/>
-    <p:sldLayoutId id="2147483656" r:id="rId8"/>
-    <p:sldLayoutId id="2147483657" r:id="rId9"/>
-    <p:sldLayoutId id="2147483658" r:id="rId10"/>
-    <p:sldLayoutId id="2147483659" r:id="rId11"/>
+    <p:sldLayoutId id="2147483661" r:id="rId1"/>
+    <p:sldLayoutId id="2147483662" r:id="rId2"/>
+    <p:sldLayoutId id="2147483663" r:id="rId3"/>
+    <p:sldLayoutId id="2147483664" r:id="rId4"/>
+    <p:sldLayoutId id="2147483665" r:id="rId5"/>
+    <p:sldLayoutId id="2147483666" r:id="rId6"/>
+    <p:sldLayoutId id="2147483667" r:id="rId7"/>
+    <p:sldLayoutId id="2147483668" r:id="rId8"/>
+    <p:sldLayoutId id="2147483669" r:id="rId9"/>
+    <p:sldLayoutId id="2147483670" r:id="rId10"/>
+    <p:sldLayoutId id="2147483671" r:id="rId11"/>
   </p:sldLayoutIdLst>
+  <p:timing>
+    <p:tnLst>
+      <p:par>
+        <p:cTn id="1" dur="indefinite" restart="never" nodeType="tmRoot"/>
+      </p:par>
+    </p:tnLst>
+  </p:timing>
   <p:txStyles>
     <p:titleStyle>
       <a:lvl1pPr algn="l" defTabSz="914400" rtl="0" eaLnBrk="1" latinLnBrk="0" hangingPunct="1">
         <a:lnSpc>
-          <a:spcPct val="90000"/>
+          <a:spcPct val="85000"/>
         </a:lnSpc>
         <a:spcBef>
           <a:spcPct val="0"/>
         </a:spcBef>
         <a:buNone/>
-        <a:defRPr sz="4400" kern="1200">
+        <a:defRPr sz="4800" kern="1200" spc="-50" baseline="0">
           <a:solidFill>
-            <a:schemeClr val="tx1"/>
+            <a:schemeClr val="tx1">
+              <a:lumMod val="75000"/>
+              <a:lumOff val="25000"/>
+            </a:schemeClr>
           </a:solidFill>
           <a:latin typeface="+mj-lt"/>
           <a:ea typeface="+mj-ea"/>
@@ -5344,162 +6185,253 @@
       </a:lvl1pPr>
     </p:titleStyle>
     <p:bodyStyle>
-      <a:lvl1pPr marL="228600" indent="-228600" algn="l" defTabSz="914400" rtl="0" eaLnBrk="1" latinLnBrk="0" hangingPunct="1">
+      <a:lvl1pPr marL="463550" marR="0" indent="-231775" algn="l" defTabSz="914400" rtl="0" eaLnBrk="1" fontAlgn="auto" latinLnBrk="0" hangingPunct="1">
         <a:lnSpc>
           <a:spcPct val="90000"/>
         </a:lnSpc>
         <a:spcBef>
-          <a:spcPts val="1000"/>
+          <a:spcPts val="1200"/>
         </a:spcBef>
+        <a:spcAft>
+          <a:spcPts val="200"/>
+        </a:spcAft>
+        <a:buClr>
+          <a:srgbClr val="1CADE4"/>
+        </a:buClr>
+        <a:buSzPct val="125000"/>
         <a:buFont typeface="Arial" panose="020B0604020202020204" pitchFamily="34" charset="0"/>
         <a:buChar char="•"/>
-        <a:defRPr sz="2800" kern="1200">
+        <a:tabLst/>
+        <a:defRPr sz="2000" kern="1200">
           <a:solidFill>
-            <a:schemeClr val="tx1"/>
+            <a:schemeClr val="tx1">
+              <a:lumMod val="75000"/>
+              <a:lumOff val="25000"/>
+            </a:schemeClr>
           </a:solidFill>
           <a:latin typeface="+mn-lt"/>
           <a:ea typeface="+mn-ea"/>
           <a:cs typeface="+mn-cs"/>
         </a:defRPr>
       </a:lvl1pPr>
-      <a:lvl2pPr marL="685800" indent="-228600" algn="l" defTabSz="914400" rtl="0" eaLnBrk="1" latinLnBrk="0" hangingPunct="1">
+      <a:lvl2pPr marL="914400" marR="0" indent="-231775" algn="l" defTabSz="914400" rtl="0" eaLnBrk="1" fontAlgn="auto" latinLnBrk="0" hangingPunct="1">
         <a:lnSpc>
           <a:spcPct val="90000"/>
         </a:lnSpc>
         <a:spcBef>
-          <a:spcPts val="500"/>
+          <a:spcPts val="200"/>
         </a:spcBef>
-        <a:buFont typeface="Arial" panose="020B0604020202020204" pitchFamily="34" charset="0"/>
-        <a:buChar char="•"/>
-        <a:defRPr sz="2400" kern="1200">
+        <a:spcAft>
+          <a:spcPts val="400"/>
+        </a:spcAft>
+        <a:buClr>
+          <a:srgbClr val="1CADE4"/>
+        </a:buClr>
+        <a:buSzPct val="125000"/>
+        <a:buFont typeface="Calibri" pitchFamily="34" charset="0"/>
+        <a:buChar char="◦"/>
+        <a:tabLst/>
+        <a:defRPr sz="1800" kern="1200">
           <a:solidFill>
-            <a:schemeClr val="tx1"/>
+            <a:schemeClr val="tx1">
+              <a:lumMod val="75000"/>
+              <a:lumOff val="25000"/>
+            </a:schemeClr>
           </a:solidFill>
           <a:latin typeface="+mn-lt"/>
           <a:ea typeface="+mn-ea"/>
           <a:cs typeface="+mn-cs"/>
         </a:defRPr>
       </a:lvl2pPr>
-      <a:lvl3pPr marL="1143000" indent="-228600" algn="l" defTabSz="914400" rtl="0" eaLnBrk="1" latinLnBrk="0" hangingPunct="1">
+      <a:lvl3pPr marL="1377950" marR="0" indent="-231775" algn="l" defTabSz="914400" rtl="0" eaLnBrk="1" fontAlgn="auto" latinLnBrk="0" hangingPunct="1">
         <a:lnSpc>
           <a:spcPct val="90000"/>
         </a:lnSpc>
         <a:spcBef>
-          <a:spcPts val="500"/>
+          <a:spcPts val="200"/>
         </a:spcBef>
-        <a:buFont typeface="Arial" panose="020B0604020202020204" pitchFamily="34" charset="0"/>
-        <a:buChar char="•"/>
-        <a:defRPr sz="2000" kern="1200">
+        <a:spcAft>
+          <a:spcPts val="400"/>
+        </a:spcAft>
+        <a:buClr>
+          <a:srgbClr val="1CADE4"/>
+        </a:buClr>
+        <a:buSzPct val="125000"/>
+        <a:buFont typeface="Calibri" pitchFamily="34" charset="0"/>
+        <a:buChar char="◦"/>
+        <a:tabLst/>
+        <a:defRPr sz="1400" kern="1200">
           <a:solidFill>
-            <a:schemeClr val="tx1"/>
+            <a:schemeClr val="tx1">
+              <a:lumMod val="75000"/>
+              <a:lumOff val="25000"/>
+            </a:schemeClr>
           </a:solidFill>
           <a:latin typeface="+mn-lt"/>
           <a:ea typeface="+mn-ea"/>
           <a:cs typeface="+mn-cs"/>
         </a:defRPr>
       </a:lvl3pPr>
-      <a:lvl4pPr marL="1600200" indent="-228600" algn="l" defTabSz="914400" rtl="0" eaLnBrk="1" latinLnBrk="0" hangingPunct="1">
+      <a:lvl4pPr marL="749808" marR="0" indent="-182880" algn="l" defTabSz="914400" rtl="0" eaLnBrk="1" fontAlgn="auto" latinLnBrk="0" hangingPunct="1">
         <a:lnSpc>
           <a:spcPct val="90000"/>
         </a:lnSpc>
         <a:spcBef>
-          <a:spcPts val="500"/>
+          <a:spcPts val="200"/>
         </a:spcBef>
-        <a:buFont typeface="Arial" panose="020B0604020202020204" pitchFamily="34" charset="0"/>
-        <a:buChar char="•"/>
-        <a:defRPr sz="1800" kern="1200">
+        <a:spcAft>
+          <a:spcPts val="400"/>
+        </a:spcAft>
+        <a:buClr>
+          <a:srgbClr val="1CADE4"/>
+        </a:buClr>
+        <a:buSzTx/>
+        <a:buFont typeface="Calibri" pitchFamily="34" charset="0"/>
+        <a:buChar char="◦"/>
+        <a:tabLst/>
+        <a:defRPr sz="1400" kern="1200">
           <a:solidFill>
-            <a:schemeClr val="tx1"/>
+            <a:schemeClr val="tx1">
+              <a:lumMod val="75000"/>
+              <a:lumOff val="25000"/>
+            </a:schemeClr>
           </a:solidFill>
           <a:latin typeface="+mn-lt"/>
           <a:ea typeface="+mn-ea"/>
           <a:cs typeface="+mn-cs"/>
         </a:defRPr>
       </a:lvl4pPr>
-      <a:lvl5pPr marL="2057400" indent="-228600" algn="l" defTabSz="914400" rtl="0" eaLnBrk="1" latinLnBrk="0" hangingPunct="1">
+      <a:lvl5pPr marL="932688" marR="0" indent="-182880" algn="l" defTabSz="914400" rtl="0" eaLnBrk="1" fontAlgn="auto" latinLnBrk="0" hangingPunct="1">
         <a:lnSpc>
           <a:spcPct val="90000"/>
         </a:lnSpc>
         <a:spcBef>
-          <a:spcPts val="500"/>
+          <a:spcPts val="200"/>
         </a:spcBef>
-        <a:buFont typeface="Arial" panose="020B0604020202020204" pitchFamily="34" charset="0"/>
-        <a:buChar char="•"/>
-        <a:defRPr sz="1800" kern="1200">
+        <a:spcAft>
+          <a:spcPts val="400"/>
+        </a:spcAft>
+        <a:buClr>
+          <a:srgbClr val="1CADE4"/>
+        </a:buClr>
+        <a:buSzTx/>
+        <a:buFont typeface="Calibri" pitchFamily="34" charset="0"/>
+        <a:buChar char="◦"/>
+        <a:tabLst/>
+        <a:defRPr sz="1400" kern="1200">
           <a:solidFill>
-            <a:schemeClr val="tx1"/>
+            <a:schemeClr val="tx1">
+              <a:lumMod val="75000"/>
+              <a:lumOff val="25000"/>
+            </a:schemeClr>
           </a:solidFill>
           <a:latin typeface="+mn-lt"/>
           <a:ea typeface="+mn-ea"/>
           <a:cs typeface="+mn-cs"/>
         </a:defRPr>
       </a:lvl5pPr>
-      <a:lvl6pPr marL="2514600" indent="-228600" algn="l" defTabSz="914400" rtl="0" eaLnBrk="1" latinLnBrk="0" hangingPunct="1">
+      <a:lvl6pPr marL="1100000" indent="-228600" algn="l" defTabSz="914400" rtl="0" eaLnBrk="1" latinLnBrk="0" hangingPunct="1">
         <a:lnSpc>
           <a:spcPct val="90000"/>
         </a:lnSpc>
         <a:spcBef>
-          <a:spcPts val="500"/>
+          <a:spcPts val="200"/>
         </a:spcBef>
-        <a:buFont typeface="Arial" panose="020B0604020202020204" pitchFamily="34" charset="0"/>
-        <a:buChar char="•"/>
-        <a:defRPr sz="1800" kern="1200">
+        <a:spcAft>
+          <a:spcPts val="400"/>
+        </a:spcAft>
+        <a:buClr>
+          <a:schemeClr val="accent1"/>
+        </a:buClr>
+        <a:buFont typeface="Calibri" pitchFamily="34" charset="0"/>
+        <a:buChar char="◦"/>
+        <a:defRPr sz="1400" kern="1200">
           <a:solidFill>
-            <a:schemeClr val="tx1"/>
+            <a:schemeClr val="tx1">
+              <a:lumMod val="75000"/>
+              <a:lumOff val="25000"/>
+            </a:schemeClr>
           </a:solidFill>
           <a:latin typeface="+mn-lt"/>
           <a:ea typeface="+mn-ea"/>
           <a:cs typeface="+mn-cs"/>
         </a:defRPr>
       </a:lvl6pPr>
-      <a:lvl7pPr marL="2971800" indent="-228600" algn="l" defTabSz="914400" rtl="0" eaLnBrk="1" latinLnBrk="0" hangingPunct="1">
+      <a:lvl7pPr marL="1300000" indent="-228600" algn="l" defTabSz="914400" rtl="0" eaLnBrk="1" latinLnBrk="0" hangingPunct="1">
         <a:lnSpc>
           <a:spcPct val="90000"/>
         </a:lnSpc>
         <a:spcBef>
-          <a:spcPts val="500"/>
+          <a:spcPts val="200"/>
         </a:spcBef>
-        <a:buFont typeface="Arial" panose="020B0604020202020204" pitchFamily="34" charset="0"/>
-        <a:buChar char="•"/>
-        <a:defRPr sz="1800" kern="1200">
+        <a:spcAft>
+          <a:spcPts val="400"/>
+        </a:spcAft>
+        <a:buClr>
+          <a:schemeClr val="accent1"/>
+        </a:buClr>
+        <a:buFont typeface="Calibri" pitchFamily="34" charset="0"/>
+        <a:buChar char="◦"/>
+        <a:defRPr sz="1400" kern="1200">
           <a:solidFill>
-            <a:schemeClr val="tx1"/>
+            <a:schemeClr val="tx1">
+              <a:lumMod val="75000"/>
+              <a:lumOff val="25000"/>
+            </a:schemeClr>
           </a:solidFill>
           <a:latin typeface="+mn-lt"/>
           <a:ea typeface="+mn-ea"/>
           <a:cs typeface="+mn-cs"/>
         </a:defRPr>
       </a:lvl7pPr>
-      <a:lvl8pPr marL="3429000" indent="-228600" algn="l" defTabSz="914400" rtl="0" eaLnBrk="1" latinLnBrk="0" hangingPunct="1">
+      <a:lvl8pPr marL="1500000" indent="-228600" algn="l" defTabSz="914400" rtl="0" eaLnBrk="1" latinLnBrk="0" hangingPunct="1">
         <a:lnSpc>
           <a:spcPct val="90000"/>
         </a:lnSpc>
         <a:spcBef>
-          <a:spcPts val="500"/>
+          <a:spcPts val="200"/>
         </a:spcBef>
-        <a:buFont typeface="Arial" panose="020B0604020202020204" pitchFamily="34" charset="0"/>
-        <a:buChar char="•"/>
-        <a:defRPr sz="1800" kern="1200">
+        <a:spcAft>
+          <a:spcPts val="400"/>
+        </a:spcAft>
+        <a:buClr>
+          <a:schemeClr val="accent1"/>
+        </a:buClr>
+        <a:buFont typeface="Calibri" pitchFamily="34" charset="0"/>
+        <a:buChar char="◦"/>
+        <a:defRPr sz="1400" kern="1200">
           <a:solidFill>
-            <a:schemeClr val="tx1"/>
+            <a:schemeClr val="tx1">
+              <a:lumMod val="75000"/>
+              <a:lumOff val="25000"/>
+            </a:schemeClr>
           </a:solidFill>
           <a:latin typeface="+mn-lt"/>
           <a:ea typeface="+mn-ea"/>
           <a:cs typeface="+mn-cs"/>
         </a:defRPr>
       </a:lvl8pPr>
-      <a:lvl9pPr marL="3886200" indent="-228600" algn="l" defTabSz="914400" rtl="0" eaLnBrk="1" latinLnBrk="0" hangingPunct="1">
+      <a:lvl9pPr marL="1700000" indent="-228600" algn="l" defTabSz="914400" rtl="0" eaLnBrk="1" latinLnBrk="0" hangingPunct="1">
         <a:lnSpc>
           <a:spcPct val="90000"/>
         </a:lnSpc>
         <a:spcBef>
-          <a:spcPts val="500"/>
+          <a:spcPts val="200"/>
         </a:spcBef>
-        <a:buFont typeface="Arial" panose="020B0604020202020204" pitchFamily="34" charset="0"/>
-        <a:buChar char="•"/>
-        <a:defRPr sz="1800" kern="1200">
+        <a:spcAft>
+          <a:spcPts val="400"/>
+        </a:spcAft>
+        <a:buClr>
+          <a:schemeClr val="accent1"/>
+        </a:buClr>
+        <a:buFont typeface="Calibri" pitchFamily="34" charset="0"/>
+        <a:buChar char="◦"/>
+        <a:defRPr sz="1400" kern="1200">
           <a:solidFill>
-            <a:schemeClr val="tx1"/>
+            <a:schemeClr val="tx1">
+              <a:lumMod val="75000"/>
+              <a:lumOff val="25000"/>
+            </a:schemeClr>
           </a:solidFill>
           <a:latin typeface="+mn-lt"/>
           <a:ea typeface="+mn-ea"/>
@@ -5603,6 +6535,11 @@
       </a:lvl9pPr>
     </p:otherStyle>
   </p:txStyles>
+  <p:extLst mod="1">
+    <p:ext uri="{27BBF7A9-308A-43DC-89C8-2F10F3537804}">
+      <p15:sldGuideLst xmlns:p15="http://schemas.microsoft.com/office/powerpoint/2012/main"/>
+    </p:ext>
+  </p:extLst>
 </p:sldMaster>
 </file>
 
@@ -5682,7 +6619,7 @@
         </p:nvSpPr>
         <p:spPr>
           <a:xfrm>
-            <a:off x="1665514" y="4429919"/>
+            <a:off x="-867622" y="5492600"/>
             <a:ext cx="9144000" cy="1655762"/>
           </a:xfrm>
           <a:prstGeom prst="rect">
@@ -5859,10 +6796,24 @@
           </a:lstStyle>
           <a:p>
             <a:r>
-              <a:rPr lang="en-US" dirty="0" smtClean="0"/>
+              <a:rPr lang="en-US" dirty="0" smtClean="0">
+                <a:solidFill>
+                  <a:schemeClr val="tx1">
+                    <a:lumMod val="75000"/>
+                    <a:lumOff val="25000"/>
+                  </a:schemeClr>
+                </a:solidFill>
+              </a:rPr>
               <a:t>Lat’Anna Davis and Stephanie Kern-Allely</a:t>
             </a:r>
-            <a:endParaRPr lang="en-US" dirty="0"/>
+            <a:endParaRPr lang="en-US" dirty="0">
+              <a:solidFill>
+                <a:schemeClr val="tx1">
+                  <a:lumMod val="75000"/>
+                  <a:lumOff val="25000"/>
+                </a:schemeClr>
+              </a:solidFill>
+            </a:endParaRPr>
           </a:p>
         </p:txBody>
       </p:sp>
@@ -5922,15 +6873,7 @@
           <a:p>
             <a:r>
               <a:rPr lang="en-US" sz="3200" dirty="0" smtClean="0"/>
-              <a:t>!Methods </a:t>
-            </a:r>
-            <a:r>
-              <a:rPr lang="en-US" sz="3200" dirty="0" smtClean="0"/>
-              <a:t>– </a:t>
-            </a:r>
-            <a:r>
-              <a:rPr lang="en-US" sz="3200" dirty="0" smtClean="0"/>
-              <a:t>Variables!</a:t>
+              <a:t>!Methods – Variables!</a:t>
             </a:r>
             <a:endParaRPr lang="en-US" sz="3200" dirty="0"/>
           </a:p>
@@ -5949,7 +6892,7 @@
         <p:spPr/>
         <p:txBody>
           <a:bodyPr>
-            <a:normAutofit lnSpcReduction="10000"/>
+            <a:normAutofit fontScale="92500" lnSpcReduction="20000"/>
           </a:bodyPr>
           <a:lstStyle/>
           <a:p>
@@ -6247,15 +7190,7 @@
           <a:p>
             <a:r>
               <a:rPr lang="en-US" sz="3200" dirty="0" smtClean="0"/>
-              <a:t>!Methods </a:t>
-            </a:r>
-            <a:r>
-              <a:rPr lang="en-US" sz="3200" dirty="0" smtClean="0"/>
-              <a:t>– </a:t>
-            </a:r>
-            <a:r>
-              <a:rPr lang="en-US" sz="3200" dirty="0" smtClean="0"/>
-              <a:t>Variables!</a:t>
+              <a:t>!Methods – Variables!</a:t>
             </a:r>
             <a:endParaRPr lang="en-US" sz="3200" dirty="0"/>
           </a:p>
@@ -6570,6 +7505,52 @@
           </a:p>
         </p:txBody>
       </p:sp>
+      <p:sp>
+        <p:nvSpPr>
+          <p:cNvPr id="4" name="Rectangle 3"/>
+          <p:cNvSpPr/>
+          <p:nvPr/>
+        </p:nvSpPr>
+        <p:spPr>
+          <a:xfrm>
+            <a:off x="4744995" y="1421027"/>
+            <a:ext cx="7348149" cy="877330"/>
+          </a:xfrm>
+          <a:prstGeom prst="rect">
+            <a:avLst/>
+          </a:prstGeom>
+          <a:solidFill>
+            <a:schemeClr val="bg1"/>
+          </a:solidFill>
+          <a:ln>
+            <a:noFill/>
+          </a:ln>
+        </p:spPr>
+        <p:style>
+          <a:lnRef idx="2">
+            <a:schemeClr val="accent1">
+              <a:shade val="50000"/>
+            </a:schemeClr>
+          </a:lnRef>
+          <a:fillRef idx="1">
+            <a:schemeClr val="accent1"/>
+          </a:fillRef>
+          <a:effectRef idx="0">
+            <a:schemeClr val="accent1"/>
+          </a:effectRef>
+          <a:fontRef idx="minor">
+            <a:schemeClr val="lt1"/>
+          </a:fontRef>
+        </p:style>
+        <p:txBody>
+          <a:bodyPr rtlCol="0" anchor="ctr"/>
+          <a:lstStyle/>
+          <a:p>
+            <a:pPr algn="ctr"/>
+            <a:endParaRPr lang="en-US"/>
+          </a:p>
+        </p:txBody>
+      </p:sp>
       <p:graphicFrame>
         <p:nvGraphicFramePr>
           <p:cNvPr id="6" name="Table 5"/>
@@ -6592,21 +7573,21 @@
                 <a:gridCol w="2879122">
                   <a:extLst>
                     <a:ext uri="{9D8B030D-6E8A-4147-A177-3AD203B41FA5}">
-                      <a16:colId xmlns:a16="http://schemas.microsoft.com/office/drawing/2014/main" val="20000"/>
+                      <a16:colId xmlns:a16="http://schemas.microsoft.com/office/drawing/2014/main" xmlns="" val="20000"/>
                     </a:ext>
                   </a:extLst>
                 </a:gridCol>
                 <a:gridCol w="1989438">
                   <a:extLst>
                     <a:ext uri="{9D8B030D-6E8A-4147-A177-3AD203B41FA5}">
-                      <a16:colId xmlns:a16="http://schemas.microsoft.com/office/drawing/2014/main" val="20001"/>
+                      <a16:colId xmlns:a16="http://schemas.microsoft.com/office/drawing/2014/main" xmlns="" val="20001"/>
                     </a:ext>
                   </a:extLst>
                 </a:gridCol>
                 <a:gridCol w="2113007">
                   <a:extLst>
                     <a:ext uri="{9D8B030D-6E8A-4147-A177-3AD203B41FA5}">
-                      <a16:colId xmlns:a16="http://schemas.microsoft.com/office/drawing/2014/main" val="20002"/>
+                      <a16:colId xmlns:a16="http://schemas.microsoft.com/office/drawing/2014/main" xmlns="" val="20002"/>
                     </a:ext>
                   </a:extLst>
                 </a:gridCol>
@@ -6845,7 +7826,7 @@
                 </a:tc>
                 <a:extLst>
                   <a:ext uri="{0D108BD9-81ED-4DB2-BD59-A6C34878D82A}">
-                    <a16:rowId xmlns:a16="http://schemas.microsoft.com/office/drawing/2014/main" val="10000"/>
+                    <a16:rowId xmlns:a16="http://schemas.microsoft.com/office/drawing/2014/main" xmlns="" val="10000"/>
                   </a:ext>
                 </a:extLst>
               </a:tr>
@@ -6963,7 +7944,7 @@
                 </a:tc>
                 <a:extLst>
                   <a:ext uri="{0D108BD9-81ED-4DB2-BD59-A6C34878D82A}">
-                    <a16:rowId xmlns:a16="http://schemas.microsoft.com/office/drawing/2014/main" val="10001"/>
+                    <a16:rowId xmlns:a16="http://schemas.microsoft.com/office/drawing/2014/main" xmlns="" val="10001"/>
                   </a:ext>
                 </a:extLst>
               </a:tr>
@@ -7060,7 +8041,7 @@
                 </a:tc>
                 <a:extLst>
                   <a:ext uri="{0D108BD9-81ED-4DB2-BD59-A6C34878D82A}">
-                    <a16:rowId xmlns:a16="http://schemas.microsoft.com/office/drawing/2014/main" val="10002"/>
+                    <a16:rowId xmlns:a16="http://schemas.microsoft.com/office/drawing/2014/main" xmlns="" val="10002"/>
                   </a:ext>
                 </a:extLst>
               </a:tr>
@@ -7157,7 +8138,7 @@
                 </a:tc>
                 <a:extLst>
                   <a:ext uri="{0D108BD9-81ED-4DB2-BD59-A6C34878D82A}">
-                    <a16:rowId xmlns:a16="http://schemas.microsoft.com/office/drawing/2014/main" val="10003"/>
+                    <a16:rowId xmlns:a16="http://schemas.microsoft.com/office/drawing/2014/main" xmlns="" val="10003"/>
                   </a:ext>
                 </a:extLst>
               </a:tr>
@@ -7254,7 +8235,7 @@
                 </a:tc>
                 <a:extLst>
                   <a:ext uri="{0D108BD9-81ED-4DB2-BD59-A6C34878D82A}">
-                    <a16:rowId xmlns:a16="http://schemas.microsoft.com/office/drawing/2014/main" val="10004"/>
+                    <a16:rowId xmlns:a16="http://schemas.microsoft.com/office/drawing/2014/main" xmlns="" val="10004"/>
                   </a:ext>
                 </a:extLst>
               </a:tr>
@@ -7357,7 +8338,7 @@
                 </a:tc>
                 <a:extLst>
                   <a:ext uri="{0D108BD9-81ED-4DB2-BD59-A6C34878D82A}">
-                    <a16:rowId xmlns:a16="http://schemas.microsoft.com/office/drawing/2014/main" val="10005"/>
+                    <a16:rowId xmlns:a16="http://schemas.microsoft.com/office/drawing/2014/main" xmlns="" val="10005"/>
                   </a:ext>
                 </a:extLst>
               </a:tr>
@@ -7473,7 +8454,7 @@
                 </a:tc>
                 <a:extLst>
                   <a:ext uri="{0D108BD9-81ED-4DB2-BD59-A6C34878D82A}">
-                    <a16:rowId xmlns:a16="http://schemas.microsoft.com/office/drawing/2014/main" val="10006"/>
+                    <a16:rowId xmlns:a16="http://schemas.microsoft.com/office/drawing/2014/main" xmlns="" val="10006"/>
                   </a:ext>
                 </a:extLst>
               </a:tr>
@@ -7568,7 +8549,7 @@
                 </a:tc>
                 <a:extLst>
                   <a:ext uri="{0D108BD9-81ED-4DB2-BD59-A6C34878D82A}">
-                    <a16:rowId xmlns:a16="http://schemas.microsoft.com/office/drawing/2014/main" val="10007"/>
+                    <a16:rowId xmlns:a16="http://schemas.microsoft.com/office/drawing/2014/main" xmlns="" val="10007"/>
                   </a:ext>
                 </a:extLst>
               </a:tr>
@@ -7680,7 +8661,7 @@
                 </a:tc>
                 <a:extLst>
                   <a:ext uri="{0D108BD9-81ED-4DB2-BD59-A6C34878D82A}">
-                    <a16:rowId xmlns:a16="http://schemas.microsoft.com/office/drawing/2014/main" val="10008"/>
+                    <a16:rowId xmlns:a16="http://schemas.microsoft.com/office/drawing/2014/main" xmlns="" val="10008"/>
                   </a:ext>
                 </a:extLst>
               </a:tr>
@@ -7777,7 +8758,7 @@
                 </a:tc>
                 <a:extLst>
                   <a:ext uri="{0D108BD9-81ED-4DB2-BD59-A6C34878D82A}">
-                    <a16:rowId xmlns:a16="http://schemas.microsoft.com/office/drawing/2014/main" val="10009"/>
+                    <a16:rowId xmlns:a16="http://schemas.microsoft.com/office/drawing/2014/main" xmlns="" val="10009"/>
                   </a:ext>
                 </a:extLst>
               </a:tr>
@@ -7874,7 +8855,7 @@
                 </a:tc>
                 <a:extLst>
                   <a:ext uri="{0D108BD9-81ED-4DB2-BD59-A6C34878D82A}">
-                    <a16:rowId xmlns:a16="http://schemas.microsoft.com/office/drawing/2014/main" val="10010"/>
+                    <a16:rowId xmlns:a16="http://schemas.microsoft.com/office/drawing/2014/main" xmlns="" val="10010"/>
                   </a:ext>
                 </a:extLst>
               </a:tr>
@@ -7971,7 +8952,7 @@
                 </a:tc>
                 <a:extLst>
                   <a:ext uri="{0D108BD9-81ED-4DB2-BD59-A6C34878D82A}">
-                    <a16:rowId xmlns:a16="http://schemas.microsoft.com/office/drawing/2014/main" val="10011"/>
+                    <a16:rowId xmlns:a16="http://schemas.microsoft.com/office/drawing/2014/main" xmlns="" val="10011"/>
                   </a:ext>
                 </a:extLst>
               </a:tr>
@@ -8083,7 +9064,7 @@
                 </a:tc>
                 <a:extLst>
                   <a:ext uri="{0D108BD9-81ED-4DB2-BD59-A6C34878D82A}">
-                    <a16:rowId xmlns:a16="http://schemas.microsoft.com/office/drawing/2014/main" val="10012"/>
+                    <a16:rowId xmlns:a16="http://schemas.microsoft.com/office/drawing/2014/main" xmlns="" val="10012"/>
                   </a:ext>
                 </a:extLst>
               </a:tr>
@@ -8178,7 +9159,7 @@
                 </a:tc>
                 <a:extLst>
                   <a:ext uri="{0D108BD9-81ED-4DB2-BD59-A6C34878D82A}">
-                    <a16:rowId xmlns:a16="http://schemas.microsoft.com/office/drawing/2014/main" val="10013"/>
+                    <a16:rowId xmlns:a16="http://schemas.microsoft.com/office/drawing/2014/main" xmlns="" val="10013"/>
                   </a:ext>
                 </a:extLst>
               </a:tr>
@@ -8290,7 +9271,7 @@
                 </a:tc>
                 <a:extLst>
                   <a:ext uri="{0D108BD9-81ED-4DB2-BD59-A6C34878D82A}">
-                    <a16:rowId xmlns:a16="http://schemas.microsoft.com/office/drawing/2014/main" val="10014"/>
+                    <a16:rowId xmlns:a16="http://schemas.microsoft.com/office/drawing/2014/main" xmlns="" val="10014"/>
                   </a:ext>
                 </a:extLst>
               </a:tr>
@@ -8387,7 +9368,7 @@
                 </a:tc>
                 <a:extLst>
                   <a:ext uri="{0D108BD9-81ED-4DB2-BD59-A6C34878D82A}">
-                    <a16:rowId xmlns:a16="http://schemas.microsoft.com/office/drawing/2014/main" val="10015"/>
+                    <a16:rowId xmlns:a16="http://schemas.microsoft.com/office/drawing/2014/main" xmlns="" val="10015"/>
                   </a:ext>
                 </a:extLst>
               </a:tr>
@@ -8484,7 +9465,7 @@
                 </a:tc>
                 <a:extLst>
                   <a:ext uri="{0D108BD9-81ED-4DB2-BD59-A6C34878D82A}">
-                    <a16:rowId xmlns:a16="http://schemas.microsoft.com/office/drawing/2014/main" val="10016"/>
+                    <a16:rowId xmlns:a16="http://schemas.microsoft.com/office/drawing/2014/main" xmlns="" val="10016"/>
                   </a:ext>
                 </a:extLst>
               </a:tr>
@@ -8581,7 +9562,7 @@
                 </a:tc>
                 <a:extLst>
                   <a:ext uri="{0D108BD9-81ED-4DB2-BD59-A6C34878D82A}">
-                    <a16:rowId xmlns:a16="http://schemas.microsoft.com/office/drawing/2014/main" val="10017"/>
+                    <a16:rowId xmlns:a16="http://schemas.microsoft.com/office/drawing/2014/main" xmlns="" val="10017"/>
                   </a:ext>
                 </a:extLst>
               </a:tr>
@@ -8699,7 +9680,7 @@
                 </a:tc>
                 <a:extLst>
                   <a:ext uri="{0D108BD9-81ED-4DB2-BD59-A6C34878D82A}">
-                    <a16:rowId xmlns:a16="http://schemas.microsoft.com/office/drawing/2014/main" val="10018"/>
+                    <a16:rowId xmlns:a16="http://schemas.microsoft.com/office/drawing/2014/main" xmlns="" val="10018"/>
                   </a:ext>
                 </a:extLst>
               </a:tr>
@@ -8788,21 +9769,21 @@
                 <a:gridCol w="2254365">
                   <a:extLst>
                     <a:ext uri="{9D8B030D-6E8A-4147-A177-3AD203B41FA5}">
-                      <a16:colId xmlns:a16="http://schemas.microsoft.com/office/drawing/2014/main" val="20000"/>
+                      <a16:colId xmlns:a16="http://schemas.microsoft.com/office/drawing/2014/main" xmlns="" val="20000"/>
                     </a:ext>
                   </a:extLst>
                 </a:gridCol>
                 <a:gridCol w="2180968">
                   <a:extLst>
                     <a:ext uri="{9D8B030D-6E8A-4147-A177-3AD203B41FA5}">
-                      <a16:colId xmlns:a16="http://schemas.microsoft.com/office/drawing/2014/main" val="20001"/>
+                      <a16:colId xmlns:a16="http://schemas.microsoft.com/office/drawing/2014/main" xmlns="" val="20001"/>
                     </a:ext>
                   </a:extLst>
                 </a:gridCol>
                 <a:gridCol w="2180968">
                   <a:extLst>
                     <a:ext uri="{9D8B030D-6E8A-4147-A177-3AD203B41FA5}">
-                      <a16:colId xmlns:a16="http://schemas.microsoft.com/office/drawing/2014/main" val="20002"/>
+                      <a16:colId xmlns:a16="http://schemas.microsoft.com/office/drawing/2014/main" xmlns="" val="20002"/>
                     </a:ext>
                   </a:extLst>
                 </a:gridCol>
@@ -8938,7 +9919,7 @@
                 </a:tc>
                 <a:extLst>
                   <a:ext uri="{0D108BD9-81ED-4DB2-BD59-A6C34878D82A}">
-                    <a16:rowId xmlns:a16="http://schemas.microsoft.com/office/drawing/2014/main" val="10000"/>
+                    <a16:rowId xmlns:a16="http://schemas.microsoft.com/office/drawing/2014/main" xmlns="" val="10000"/>
                   </a:ext>
                 </a:extLst>
               </a:tr>
@@ -9047,7 +10028,7 @@
                 </a:tc>
                 <a:extLst>
                   <a:ext uri="{0D108BD9-81ED-4DB2-BD59-A6C34878D82A}">
-                    <a16:rowId xmlns:a16="http://schemas.microsoft.com/office/drawing/2014/main" val="10001"/>
+                    <a16:rowId xmlns:a16="http://schemas.microsoft.com/office/drawing/2014/main" xmlns="" val="10001"/>
                   </a:ext>
                 </a:extLst>
               </a:tr>
@@ -9136,21 +10117,21 @@
                 <a:gridCol w="2483251">
                   <a:extLst>
                     <a:ext uri="{9D8B030D-6E8A-4147-A177-3AD203B41FA5}">
-                      <a16:colId xmlns:a16="http://schemas.microsoft.com/office/drawing/2014/main" val="20000"/>
+                      <a16:colId xmlns:a16="http://schemas.microsoft.com/office/drawing/2014/main" xmlns="" val="20000"/>
                     </a:ext>
                   </a:extLst>
                 </a:gridCol>
                 <a:gridCol w="2066525">
                   <a:extLst>
                     <a:ext uri="{9D8B030D-6E8A-4147-A177-3AD203B41FA5}">
-                      <a16:colId xmlns:a16="http://schemas.microsoft.com/office/drawing/2014/main" val="20001"/>
+                      <a16:colId xmlns:a16="http://schemas.microsoft.com/office/drawing/2014/main" xmlns="" val="20001"/>
                     </a:ext>
                   </a:extLst>
                 </a:gridCol>
                 <a:gridCol w="2066525">
                   <a:extLst>
                     <a:ext uri="{9D8B030D-6E8A-4147-A177-3AD203B41FA5}">
-                      <a16:colId xmlns:a16="http://schemas.microsoft.com/office/drawing/2014/main" val="20002"/>
+                      <a16:colId xmlns:a16="http://schemas.microsoft.com/office/drawing/2014/main" xmlns="" val="20002"/>
                     </a:ext>
                   </a:extLst>
                 </a:gridCol>
@@ -9286,7 +10267,7 @@
                 </a:tc>
                 <a:extLst>
                   <a:ext uri="{0D108BD9-81ED-4DB2-BD59-A6C34878D82A}">
-                    <a16:rowId xmlns:a16="http://schemas.microsoft.com/office/drawing/2014/main" val="10000"/>
+                    <a16:rowId xmlns:a16="http://schemas.microsoft.com/office/drawing/2014/main" xmlns="" val="10000"/>
                   </a:ext>
                 </a:extLst>
               </a:tr>
@@ -9401,7 +10382,7 @@
                 </a:tc>
                 <a:extLst>
                   <a:ext uri="{0D108BD9-81ED-4DB2-BD59-A6C34878D82A}">
-                    <a16:rowId xmlns:a16="http://schemas.microsoft.com/office/drawing/2014/main" val="10001"/>
+                    <a16:rowId xmlns:a16="http://schemas.microsoft.com/office/drawing/2014/main" xmlns="" val="10001"/>
                   </a:ext>
                 </a:extLst>
               </a:tr>
@@ -9516,7 +10497,7 @@
                 </a:tc>
                 <a:extLst>
                   <a:ext uri="{0D108BD9-81ED-4DB2-BD59-A6C34878D82A}">
-                    <a16:rowId xmlns:a16="http://schemas.microsoft.com/office/drawing/2014/main" val="10002"/>
+                    <a16:rowId xmlns:a16="http://schemas.microsoft.com/office/drawing/2014/main" xmlns="" val="10002"/>
                   </a:ext>
                 </a:extLst>
               </a:tr>
@@ -9625,7 +10606,7 @@
                 </a:tc>
                 <a:extLst>
                   <a:ext uri="{0D108BD9-81ED-4DB2-BD59-A6C34878D82A}">
-                    <a16:rowId xmlns:a16="http://schemas.microsoft.com/office/drawing/2014/main" val="10003"/>
+                    <a16:rowId xmlns:a16="http://schemas.microsoft.com/office/drawing/2014/main" xmlns="" val="10003"/>
                   </a:ext>
                 </a:extLst>
               </a:tr>
@@ -9706,7 +10687,7 @@
         <p:spPr/>
         <p:txBody>
           <a:bodyPr>
-            <a:normAutofit/>
+            <a:noAutofit/>
           </a:bodyPr>
           <a:lstStyle/>
           <a:p>
@@ -9715,7 +10696,7 @@
               <a:buChar char="Ø"/>
             </a:pPr>
             <a:r>
-              <a:rPr lang="en-US" dirty="0" smtClean="0"/>
+              <a:rPr lang="en-US" sz="2400" dirty="0" smtClean="0"/>
               <a:t>Conclusion</a:t>
             </a:r>
           </a:p>
@@ -9725,14 +10706,14 @@
               <a:buChar char="Ø"/>
             </a:pPr>
             <a:r>
-              <a:rPr lang="en-US" dirty="0"/>
+              <a:rPr lang="en-US" sz="1800" dirty="0"/>
               <a:t>The magnitude of association between trust in honesty of information and belief in protection was higher as social distance  decreased. The findings suggest that local government should be considered as a key communication avenue for effective emergency response to a terrorist attack</a:t>
             </a:r>
             <a:r>
-              <a:rPr lang="en-US" dirty="0" smtClean="0"/>
+              <a:rPr lang="en-US" sz="1800" dirty="0" smtClean="0"/>
               <a:t>.</a:t>
             </a:r>
-            <a:endParaRPr lang="en-US" dirty="0" smtClean="0"/>
+            <a:endParaRPr lang="en-US" sz="1800" dirty="0" smtClean="0"/>
           </a:p>
           <a:p>
             <a:pPr lvl="1">
@@ -9740,35 +10721,37 @@
               <a:buChar char="Ø"/>
             </a:pPr>
             <a:r>
-              <a:rPr lang="en-US" dirty="0" smtClean="0"/>
-              <a:t>Limitations</a:t>
-            </a:r>
+              <a:rPr lang="en-US" sz="2400" dirty="0" smtClean="0"/>
+              <a:t>Strengths/Limitations</a:t>
+            </a:r>
+          </a:p>
+          <a:p>
+            <a:pPr lvl="1">
+              <a:buFont typeface="Wingdings" panose="05000000000000000000" pitchFamily="2" charset="2"/>
+              <a:buChar char="Ø"/>
+            </a:pPr>
+            <a:endParaRPr lang="en-US" sz="2400" dirty="0"/>
+          </a:p>
+          <a:p>
+            <a:pPr lvl="1">
+              <a:buFont typeface="Wingdings" panose="05000000000000000000" pitchFamily="2" charset="2"/>
+              <a:buChar char="Ø"/>
+            </a:pPr>
+            <a:endParaRPr lang="en-US" sz="2400" dirty="0" smtClean="0"/>
+          </a:p>
+          <a:p>
+            <a:pPr lvl="1">
+              <a:buFont typeface="Wingdings" panose="05000000000000000000" pitchFamily="2" charset="2"/>
+              <a:buChar char="Ø"/>
+            </a:pPr>
+            <a:endParaRPr lang="en-US" sz="2400" dirty="0" smtClean="0"/>
           </a:p>
           <a:p>
             <a:pPr lvl="2">
               <a:buFont typeface="Wingdings" panose="05000000000000000000" pitchFamily="2" charset="2"/>
               <a:buChar char="Ø"/>
             </a:pPr>
-            <a:r>
-              <a:rPr lang="en-US" dirty="0" smtClean="0"/>
-              <a:t>Categorization amongst local, state, and federal officials are not measured the same</a:t>
-            </a:r>
-          </a:p>
-          <a:p>
-            <a:pPr lvl="3">
-              <a:buFont typeface="Wingdings" panose="05000000000000000000" pitchFamily="2" charset="2"/>
-              <a:buChar char="Ø"/>
-            </a:pPr>
-            <a:r>
-              <a:rPr lang="en-US" dirty="0" smtClean="0"/>
-              <a:t>Not all levels of government have the same official roles</a:t>
-            </a:r>
-          </a:p>
-          <a:p>
-            <a:pPr marL="457200" lvl="1" indent="0">
-              <a:buNone/>
-            </a:pPr>
-            <a:endParaRPr lang="en-US" dirty="0" smtClean="0"/>
+            <a:endParaRPr lang="en-US" sz="2400" dirty="0" smtClean="0"/>
           </a:p>
           <a:p>
             <a:pPr lvl="1">
@@ -9776,16 +10759,8 @@
               <a:buChar char="Ø"/>
             </a:pPr>
             <a:r>
-              <a:rPr lang="en-US" dirty="0" smtClean="0"/>
-              <a:t>Further </a:t>
-            </a:r>
-            <a:r>
-              <a:rPr lang="en-US" dirty="0" smtClean="0"/>
-              <a:t>D</a:t>
-            </a:r>
-            <a:r>
-              <a:rPr lang="en-US" dirty="0" smtClean="0"/>
-              <a:t>irection</a:t>
+              <a:rPr lang="en-US" sz="2400" dirty="0" smtClean="0"/>
+              <a:t>Further Direction</a:t>
             </a:r>
           </a:p>
           <a:p>
@@ -9794,24 +10769,266 @@
               <a:buChar char="Ø"/>
             </a:pPr>
             <a:r>
-              <a:rPr lang="en-US" dirty="0" smtClean="0"/>
-              <a:t>Further research on whether the influence of protection differ for local, state, and </a:t>
-            </a:r>
-            <a:r>
-              <a:rPr lang="en-US" smtClean="0"/>
-              <a:t>federal government levels </a:t>
-            </a:r>
-            <a:endParaRPr lang="en-US" dirty="0" smtClean="0"/>
+              <a:rPr lang="en-US" sz="1800" dirty="0" smtClean="0"/>
+              <a:t>Further research on whether the influence of protection differ for local, state, and federal government levels </a:t>
+            </a:r>
           </a:p>
           <a:p>
             <a:pPr lvl="1">
               <a:buFont typeface="Wingdings" panose="05000000000000000000" pitchFamily="2" charset="2"/>
               <a:buChar char="Ø"/>
             </a:pPr>
-            <a:endParaRPr lang="en-US" dirty="0"/>
+            <a:endParaRPr lang="en-US" sz="2400" dirty="0"/>
           </a:p>
         </p:txBody>
       </p:sp>
+      <p:graphicFrame>
+        <p:nvGraphicFramePr>
+          <p:cNvPr id="4" name="Table 3"/>
+          <p:cNvGraphicFramePr>
+            <a:graphicFrameLocks noGrp="1"/>
+          </p:cNvGraphicFramePr>
+          <p:nvPr>
+            <p:extLst>
+              <p:ext uri="{D42A27DB-BD31-4B8C-83A1-F6EECF244321}">
+                <p14:modId xmlns:p14="http://schemas.microsoft.com/office/powerpoint/2010/main" val="2887144892"/>
+              </p:ext>
+            </p:extLst>
+          </p:nvPr>
+        </p:nvGraphicFramePr>
+        <p:xfrm>
+          <a:off x="1967949" y="3671994"/>
+          <a:ext cx="9680712" cy="1737360"/>
+        </p:xfrm>
+        <a:graphic>
+          <a:graphicData uri="http://schemas.openxmlformats.org/drawingml/2006/table">
+            <a:tbl>
+              <a:tblPr firstRow="1" bandRow="1">
+                <a:tableStyleId>{2D5ABB26-0587-4C30-8999-92F81FD0307C}</a:tableStyleId>
+              </a:tblPr>
+              <a:tblGrid>
+                <a:gridCol w="4006514"/>
+                <a:gridCol w="5674198"/>
+              </a:tblGrid>
+              <a:tr h="370840">
+                <a:tc>
+                  <a:txBody>
+                    <a:bodyPr/>
+                    <a:lstStyle/>
+                    <a:p>
+                      <a:pPr marL="285750" marR="0" lvl="0" indent="-285750" algn="l" defTabSz="914400" rtl="0" eaLnBrk="1" fontAlgn="auto" latinLnBrk="0" hangingPunct="1">
+                        <a:lnSpc>
+                          <a:spcPct val="100000"/>
+                        </a:lnSpc>
+                        <a:spcBef>
+                          <a:spcPts val="0"/>
+                        </a:spcBef>
+                        <a:spcAft>
+                          <a:spcPts val="0"/>
+                        </a:spcAft>
+                        <a:buClrTx/>
+                        <a:buSzTx/>
+                        <a:buFont typeface="Wingdings" panose="05000000000000000000" pitchFamily="2" charset="2"/>
+                        <a:buChar char="Ø"/>
+                        <a:tabLst/>
+                        <a:defRPr/>
+                      </a:pPr>
+                      <a:r>
+                        <a:rPr lang="en-US" sz="1800" dirty="0" smtClean="0">
+                          <a:solidFill>
+                            <a:schemeClr val="tx1">
+                              <a:lumMod val="75000"/>
+                              <a:lumOff val="25000"/>
+                            </a:schemeClr>
+                          </a:solidFill>
+                        </a:rPr>
+                        <a:t>Examine relation at multiple government levels</a:t>
+                      </a:r>
+                    </a:p>
+                    <a:p>
+                      <a:pPr marL="285750" marR="0" lvl="0" indent="-285750" algn="l" defTabSz="914400" rtl="0" eaLnBrk="1" fontAlgn="auto" latinLnBrk="0" hangingPunct="1">
+                        <a:lnSpc>
+                          <a:spcPct val="100000"/>
+                        </a:lnSpc>
+                        <a:spcBef>
+                          <a:spcPts val="0"/>
+                        </a:spcBef>
+                        <a:spcAft>
+                          <a:spcPts val="0"/>
+                        </a:spcAft>
+                        <a:buClrTx/>
+                        <a:buSzTx/>
+                        <a:buFont typeface="Wingdings" panose="05000000000000000000" pitchFamily="2" charset="2"/>
+                        <a:buChar char="Ø"/>
+                        <a:tabLst/>
+                        <a:defRPr/>
+                      </a:pPr>
+                      <a:r>
+                        <a:rPr lang="en-US" sz="1800" dirty="0" smtClean="0">
+                          <a:solidFill>
+                            <a:schemeClr val="tx1">
+                              <a:lumMod val="75000"/>
+                              <a:lumOff val="25000"/>
+                            </a:schemeClr>
+                          </a:solidFill>
+                        </a:rPr>
+                        <a:t>Uses nationally representative sample</a:t>
+                      </a:r>
+                    </a:p>
+                    <a:p>
+                      <a:pPr marL="285750" marR="0" lvl="0" indent="-285750" algn="l" defTabSz="914400" rtl="0" eaLnBrk="1" fontAlgn="auto" latinLnBrk="0" hangingPunct="1">
+                        <a:lnSpc>
+                          <a:spcPct val="100000"/>
+                        </a:lnSpc>
+                        <a:spcBef>
+                          <a:spcPts val="0"/>
+                        </a:spcBef>
+                        <a:spcAft>
+                          <a:spcPts val="0"/>
+                        </a:spcAft>
+                        <a:buClrTx/>
+                        <a:buSzTx/>
+                        <a:buFont typeface="Wingdings" panose="05000000000000000000" pitchFamily="2" charset="2"/>
+                        <a:buChar char="Ø"/>
+                        <a:tabLst/>
+                        <a:defRPr/>
+                      </a:pPr>
+                      <a:r>
+                        <a:rPr lang="en-US" sz="1800" dirty="0" smtClean="0">
+                          <a:solidFill>
+                            <a:schemeClr val="tx1">
+                              <a:lumMod val="75000"/>
+                              <a:lumOff val="25000"/>
+                            </a:schemeClr>
+                          </a:solidFill>
+                        </a:rPr>
+                        <a:t>Adjusted</a:t>
+                      </a:r>
+                      <a:r>
+                        <a:rPr lang="en-US" sz="1800" baseline="0" dirty="0" smtClean="0">
+                          <a:solidFill>
+                            <a:schemeClr val="tx1">
+                              <a:lumMod val="75000"/>
+                              <a:lumOff val="25000"/>
+                            </a:schemeClr>
+                          </a:solidFill>
+                        </a:rPr>
+                        <a:t> for other important emergency preparedness constructs</a:t>
+                      </a:r>
+                      <a:endParaRPr lang="en-US" sz="1800" dirty="0" smtClean="0">
+                        <a:solidFill>
+                          <a:schemeClr val="tx1">
+                            <a:lumMod val="75000"/>
+                            <a:lumOff val="25000"/>
+                          </a:schemeClr>
+                        </a:solidFill>
+                      </a:endParaRPr>
+                    </a:p>
+                    <a:p>
+                      <a:pPr marL="0" indent="0">
+                        <a:buFont typeface="Arial" panose="020B0604020202020204" pitchFamily="34" charset="0"/>
+                        <a:buNone/>
+                      </a:pPr>
+                      <a:endParaRPr lang="en-US" dirty="0">
+                        <a:solidFill>
+                          <a:schemeClr val="tx1">
+                            <a:lumMod val="75000"/>
+                            <a:lumOff val="25000"/>
+                          </a:schemeClr>
+                        </a:solidFill>
+                      </a:endParaRPr>
+                    </a:p>
+                  </a:txBody>
+                  <a:tcPr/>
+                </a:tc>
+                <a:tc>
+                  <a:txBody>
+                    <a:bodyPr/>
+                    <a:lstStyle/>
+                    <a:p>
+                      <a:pPr lvl="2">
+                        <a:buFont typeface="Wingdings" panose="05000000000000000000" pitchFamily="2" charset="2"/>
+                        <a:buChar char="Ø"/>
+                      </a:pPr>
+                      <a:r>
+                        <a:rPr lang="en-US" sz="1800" dirty="0" smtClean="0">
+                          <a:solidFill>
+                            <a:schemeClr val="tx1">
+                              <a:lumMod val="75000"/>
+                              <a:lumOff val="25000"/>
+                            </a:schemeClr>
+                          </a:solidFill>
+                        </a:rPr>
+                        <a:t> Categorization amongst local, state, and federal officials are not measured the same</a:t>
+                      </a:r>
+                    </a:p>
+                    <a:p>
+                      <a:pPr lvl="2">
+                        <a:buFont typeface="Wingdings" panose="05000000000000000000" pitchFamily="2" charset="2"/>
+                        <a:buChar char="Ø"/>
+                      </a:pPr>
+                      <a:r>
+                        <a:rPr lang="en-US" sz="1800" dirty="0" smtClean="0">
+                          <a:solidFill>
+                            <a:schemeClr val="tx1">
+                              <a:lumMod val="75000"/>
+                              <a:lumOff val="25000"/>
+                            </a:schemeClr>
+                          </a:solidFill>
+                        </a:rPr>
+                        <a:t> Not all levels of government have the same official roles</a:t>
+                      </a:r>
+                    </a:p>
+                    <a:p>
+                      <a:pPr lvl="2">
+                        <a:buFont typeface="Wingdings" panose="05000000000000000000" pitchFamily="2" charset="2"/>
+                        <a:buChar char="Ø"/>
+                      </a:pPr>
+                      <a:r>
+                        <a:rPr lang="en-US" sz="1800" dirty="0" smtClean="0">
+                          <a:solidFill>
+                            <a:schemeClr val="tx1">
+                              <a:lumMod val="75000"/>
+                              <a:lumOff val="25000"/>
+                            </a:schemeClr>
+                          </a:solidFill>
+                        </a:rPr>
+                        <a:t> Loss of variation due to collapsing categories</a:t>
+                      </a:r>
+                    </a:p>
+                    <a:p>
+                      <a:pPr lvl="2">
+                        <a:buFont typeface="Wingdings" panose="05000000000000000000" pitchFamily="2" charset="2"/>
+                        <a:buChar char="Ø"/>
+                      </a:pPr>
+                      <a:r>
+                        <a:rPr lang="en-US" sz="1800" dirty="0" smtClean="0">
+                          <a:solidFill>
+                            <a:schemeClr val="tx1">
+                              <a:lumMod val="75000"/>
+                              <a:lumOff val="25000"/>
+                            </a:schemeClr>
+                          </a:solidFill>
+                        </a:rPr>
+                        <a:t> Selection bias due to missing information</a:t>
+                      </a:r>
+                      <a:endParaRPr lang="en-US" dirty="0">
+                        <a:solidFill>
+                          <a:schemeClr val="tx1">
+                            <a:lumMod val="75000"/>
+                            <a:lumOff val="25000"/>
+                          </a:schemeClr>
+                        </a:solidFill>
+                      </a:endParaRPr>
+                    </a:p>
+                  </a:txBody>
+                  <a:tcPr/>
+                </a:tc>
+              </a:tr>
+            </a:tbl>
+          </a:graphicData>
+        </a:graphic>
+      </p:graphicFrame>
     </p:spTree>
     <p:extLst>
       <p:ext uri="{BB962C8B-B14F-4D97-AF65-F5344CB8AC3E}">
@@ -9885,7 +11102,7 @@
         <p:spPr/>
         <p:txBody>
           <a:bodyPr>
-            <a:normAutofit/>
+            <a:normAutofit lnSpcReduction="10000"/>
           </a:bodyPr>
           <a:lstStyle/>
           <a:p>
@@ -10177,7 +11394,15 @@
             </a:pPr>
             <a:r>
               <a:rPr lang="en-US" dirty="0"/>
-              <a:t>Does it differ from local, state and federal levels</a:t>
+              <a:t>Does it differ </a:t>
+            </a:r>
+            <a:r>
+              <a:rPr lang="en-US" dirty="0" smtClean="0"/>
+              <a:t>at local</a:t>
+            </a:r>
+            <a:r>
+              <a:rPr lang="en-US" dirty="0"/>
+              <a:t>, state and federal levels</a:t>
             </a:r>
             <a:r>
               <a:rPr lang="en-US" dirty="0" smtClean="0"/>
@@ -10246,15 +11471,20 @@
           <a:p>
             <a:r>
               <a:rPr lang="en-US" b="1" dirty="0" smtClean="0"/>
-              <a:t>!Laymen Terms</a:t>
-            </a:r>
-            <a:r>
-              <a:rPr lang="en-US" b="1" dirty="0"/>
               <a:t>!</a:t>
             </a:r>
-            <a:br>
-              <a:rPr lang="en-US" b="1" dirty="0"/>
-            </a:br>
+            <a:r>
+              <a:rPr lang="en-US" b="1" dirty="0" smtClean="0"/>
+              <a:t>Layman’s </a:t>
+            </a:r>
+            <a:r>
+              <a:rPr lang="en-US" b="1" dirty="0" smtClean="0"/>
+              <a:t>Terms</a:t>
+            </a:r>
+            <a:r>
+              <a:rPr lang="en-US" b="1" dirty="0" smtClean="0"/>
+              <a:t>!</a:t>
+            </a:r>
             <a:endParaRPr lang="en-US" b="1" dirty="0"/>
           </a:p>
         </p:txBody>
@@ -10329,12 +11559,14 @@
         </p:nvSpPr>
         <p:spPr>
           <a:xfrm>
-            <a:off x="249381" y="4108862"/>
+            <a:off x="1177059" y="3392170"/>
             <a:ext cx="11014941" cy="1083005"/>
           </a:xfrm>
         </p:spPr>
         <p:txBody>
-          <a:bodyPr/>
+          <a:bodyPr>
+            <a:normAutofit fontScale="90000"/>
+          </a:bodyPr>
           <a:lstStyle/>
           <a:p>
             <a:r>
@@ -10401,15 +11633,7 @@
           <a:p>
             <a:r>
               <a:rPr lang="en-US" sz="3200" dirty="0" smtClean="0"/>
-              <a:t>!Methods </a:t>
-            </a:r>
-            <a:r>
-              <a:rPr lang="en-US" sz="3200" dirty="0" smtClean="0"/>
-              <a:t>– </a:t>
-            </a:r>
-            <a:r>
-              <a:rPr lang="en-US" sz="3200" dirty="0" smtClean="0"/>
-              <a:t>Dataset!</a:t>
+              <a:t>!Methods – Dataset!</a:t>
             </a:r>
             <a:endParaRPr lang="en-US" sz="3200" dirty="0"/>
           </a:p>
@@ -10600,12 +11824,7 @@
             <p:ph type="title"/>
           </p:nvPr>
         </p:nvSpPr>
-        <p:spPr>
-          <a:xfrm>
-            <a:off x="838200" y="365125"/>
-            <a:ext cx="10515600" cy="1325563"/>
-          </a:xfrm>
-        </p:spPr>
+        <p:spPr/>
         <p:txBody>
           <a:bodyPr>
             <a:noAutofit/>
@@ -10614,15 +11833,7 @@
           <a:p>
             <a:r>
               <a:rPr lang="en-US" sz="3200" dirty="0" smtClean="0"/>
-              <a:t>!Methods </a:t>
-            </a:r>
-            <a:r>
-              <a:rPr lang="en-US" sz="3200" dirty="0" smtClean="0"/>
-              <a:t>– Data </a:t>
-            </a:r>
-            <a:r>
-              <a:rPr lang="en-US" sz="3200" dirty="0" smtClean="0"/>
-              <a:t>Analysis!</a:t>
+              <a:t>!Methods – Data Analysis!</a:t>
             </a:r>
             <a:endParaRPr lang="en-US" sz="3200" dirty="0"/>
           </a:p>
@@ -10736,18 +11947,18 @@
             <a:spLocks noGrp="1"/>
           </p:cNvSpPr>
           <p:nvPr>
-            <p:ph idx="1"/>
+            <p:ph idx="4294967295"/>
           </p:nvPr>
         </p:nvSpPr>
         <p:spPr>
           <a:xfrm>
-            <a:off x="555171" y="5475513"/>
-            <a:ext cx="11234058" cy="1197429"/>
+            <a:off x="958850" y="5327007"/>
+            <a:ext cx="11233150" cy="1196975"/>
           </a:xfrm>
         </p:spPr>
         <p:txBody>
           <a:bodyPr>
-            <a:normAutofit fontScale="85000" lnSpcReduction="10000"/>
+            <a:normAutofit/>
           </a:bodyPr>
           <a:lstStyle/>
           <a:p>
@@ -10756,16 +11967,30 @@
             </a:pPr>
             <a:r>
               <a:rPr lang="en-US" dirty="0" smtClean="0"/>
-              <a:t>Proposed adjusted model: </a:t>
-            </a:r>
-          </a:p>
-          <a:p>
-            <a:pPr marL="0" indent="0">
-              <a:buNone/>
-            </a:pPr>
+              <a:t>Proposed adjusted </a:t>
+            </a:r>
             <a:r>
               <a:rPr lang="en-US" dirty="0" smtClean="0"/>
-              <a:t>Trust that government can protect from terrorism = Trust that government is honest with public + Age + Education + Belief of information received + Perceived risk of terrorism</a:t>
+              <a:t>model: </a:t>
+            </a:r>
+            <a:br>
+              <a:rPr lang="en-US" dirty="0" smtClean="0"/>
+            </a:br>
+            <a:r>
+              <a:rPr lang="en-US" dirty="0" smtClean="0"/>
+              <a:t>Trust </a:t>
+            </a:r>
+            <a:r>
+              <a:rPr lang="en-US" dirty="0" smtClean="0"/>
+              <a:t>that government </a:t>
+            </a:r>
+            <a:r>
+              <a:rPr lang="en-US" dirty="0" smtClean="0"/>
+              <a:t>can </a:t>
+            </a:r>
+            <a:r>
+              <a:rPr lang="en-US" dirty="0" smtClean="0"/>
+              <a:t>protect from terrorism = Trust that government is honest with public + Age + Education + Belief of information received + Perceived risk of terrorism</a:t>
             </a:r>
             <a:endParaRPr lang="en-US" dirty="0"/>
           </a:p>
@@ -10786,7 +12011,7 @@
         </p:blipFill>
         <p:spPr>
           <a:xfrm>
-            <a:off x="1741713" y="337456"/>
+            <a:off x="1754070" y="189175"/>
             <a:ext cx="8251373" cy="5040087"/>
           </a:xfrm>
           <a:prstGeom prst="rect">
@@ -11318,15 +12543,7 @@
           <a:p>
             <a:r>
               <a:rPr lang="en-US" sz="3200" dirty="0" smtClean="0"/>
-              <a:t>!Methods </a:t>
-            </a:r>
-            <a:r>
-              <a:rPr lang="en-US" sz="3200" dirty="0" smtClean="0"/>
-              <a:t>– Data </a:t>
-            </a:r>
-            <a:r>
-              <a:rPr lang="en-US" sz="3200" dirty="0" smtClean="0"/>
-              <a:t>Analysis!</a:t>
+              <a:t>!Methods – Data Analysis!</a:t>
             </a:r>
             <a:endParaRPr lang="en-US" sz="3200" dirty="0"/>
           </a:p>
@@ -11437,9 +12654,9 @@
 </file>
 
 <file path=ppt/theme/theme1.xml><?xml version="1.0" encoding="utf-8"?>
-<a:theme xmlns:a="http://schemas.openxmlformats.org/drawingml/2006/main" name="Office Theme">
+<a:theme xmlns:a="http://schemas.openxmlformats.org/drawingml/2006/main" name="Theme1">
   <a:themeElements>
-    <a:clrScheme name="Office 2007-2010">
+    <a:clrScheme name="Retrospect">
       <a:dk1>
         <a:sysClr val="windowText" lastClr="000000"/>
       </a:dk1>
@@ -11447,37 +12664,37 @@
         <a:sysClr val="window" lastClr="FFFFFF"/>
       </a:lt1>
       <a:dk2>
-        <a:srgbClr val="1F497D"/>
+        <a:srgbClr val="344068"/>
       </a:dk2>
       <a:lt2>
-        <a:srgbClr val="EEECE1"/>
+        <a:srgbClr val="D9E0E6"/>
       </a:lt2>
       <a:accent1>
-        <a:srgbClr val="4F81BD"/>
+        <a:srgbClr val="1CADE4"/>
       </a:accent1>
       <a:accent2>
-        <a:srgbClr val="C0504D"/>
+        <a:srgbClr val="2683C6"/>
       </a:accent2>
       <a:accent3>
-        <a:srgbClr val="9BBB59"/>
+        <a:srgbClr val="28C4CC"/>
       </a:accent3>
       <a:accent4>
-        <a:srgbClr val="8064A2"/>
+        <a:srgbClr val="42BA97"/>
       </a:accent4>
       <a:accent5>
-        <a:srgbClr val="4BACC6"/>
+        <a:srgbClr val="3E8853"/>
       </a:accent5>
       <a:accent6>
-        <a:srgbClr val="F79646"/>
+        <a:srgbClr val="62A39F"/>
       </a:accent6>
       <a:hlink>
-        <a:srgbClr val="0000FF"/>
+        <a:srgbClr val="6EAC1C"/>
       </a:hlink>
       <a:folHlink>
-        <a:srgbClr val="800080"/>
+        <a:srgbClr val="B26B02"/>
       </a:folHlink>
     </a:clrScheme>
-    <a:fontScheme name="Office">
+    <a:fontScheme name="Retrospect">
       <a:majorFont>
         <a:latin typeface="Calibri Light" panose="020F0302020204030204"/>
         <a:ea typeface=""/>
@@ -11549,7 +12766,7 @@
         <a:font script="Geor" typeface="Sylfaen"/>
       </a:minorFont>
     </a:fontScheme>
-    <a:fmtScheme name="Office">
+    <a:fmtScheme name="Retrospect">
       <a:fillStyleLst>
         <a:solidFill>
           <a:schemeClr val="phClr"/>
@@ -11558,76 +12775,81 @@
           <a:gsLst>
             <a:gs pos="0">
               <a:schemeClr val="phClr">
-                <a:lumMod val="110000"/>
-                <a:satMod val="105000"/>
-                <a:tint val="67000"/>
+                <a:tint val="65000"/>
+                <a:shade val="92000"/>
+                <a:satMod val="130000"/>
               </a:schemeClr>
             </a:gs>
-            <a:gs pos="50000">
+            <a:gs pos="45000">
               <a:schemeClr val="phClr">
-                <a:lumMod val="105000"/>
-                <a:satMod val="103000"/>
-                <a:tint val="73000"/>
+                <a:tint val="60000"/>
+                <a:shade val="99000"/>
+                <a:satMod val="120000"/>
               </a:schemeClr>
             </a:gs>
             <a:gs pos="100000">
               <a:schemeClr val="phClr">
-                <a:lumMod val="105000"/>
-                <a:satMod val="109000"/>
-                <a:tint val="81000"/>
+                <a:tint val="55000"/>
+                <a:satMod val="140000"/>
               </a:schemeClr>
             </a:gs>
           </a:gsLst>
-          <a:lin ang="5400000" scaled="0"/>
+          <a:path path="circle">
+            <a:fillToRect l="100000" t="100000" r="100000" b="100000"/>
+          </a:path>
         </a:gradFill>
         <a:gradFill rotWithShape="1">
           <a:gsLst>
             <a:gs pos="0">
               <a:schemeClr val="phClr">
-                <a:satMod val="103000"/>
-                <a:lumMod val="102000"/>
-                <a:tint val="94000"/>
+                <a:shade val="85000"/>
+                <a:satMod val="130000"/>
               </a:schemeClr>
             </a:gs>
-            <a:gs pos="50000">
+            <a:gs pos="34000">
               <a:schemeClr val="phClr">
-                <a:satMod val="110000"/>
-                <a:lumMod val="100000"/>
-                <a:shade val="100000"/>
+                <a:shade val="87000"/>
+                <a:satMod val="125000"/>
+              </a:schemeClr>
+            </a:gs>
+            <a:gs pos="70000">
+              <a:schemeClr val="phClr">
+                <a:tint val="100000"/>
+                <a:shade val="90000"/>
+                <a:satMod val="130000"/>
               </a:schemeClr>
             </a:gs>
             <a:gs pos="100000">
               <a:schemeClr val="phClr">
-                <a:lumMod val="99000"/>
-                <a:satMod val="120000"/>
-                <a:shade val="78000"/>
+                <a:tint val="100000"/>
+                <a:shade val="100000"/>
+                <a:satMod val="110000"/>
               </a:schemeClr>
             </a:gs>
           </a:gsLst>
-          <a:lin ang="5400000" scaled="0"/>
+          <a:path path="circle">
+            <a:fillToRect l="100000" t="100000" r="100000" b="100000"/>
+          </a:path>
         </a:gradFill>
       </a:fillStyleLst>
       <a:lnStyleLst>
-        <a:ln w="6350" cap="flat" cmpd="sng" algn="ctr">
-          <a:solidFill>
-            <a:schemeClr val="phClr"/>
-          </a:solidFill>
-          <a:prstDash val="solid"/>
-          <a:miter lim="800000"/>
-        </a:ln>
         <a:ln w="12700" cap="flat" cmpd="sng" algn="ctr">
           <a:solidFill>
             <a:schemeClr val="phClr"/>
           </a:solidFill>
           <a:prstDash val="solid"/>
-          <a:miter lim="800000"/>
         </a:ln>
-        <a:ln w="19050" cap="flat" cmpd="sng" algn="ctr">
+        <a:ln w="15875" cap="flat" cmpd="sng" algn="ctr">
           <a:solidFill>
             <a:schemeClr val="phClr"/>
           </a:solidFill>
           <a:prstDash val="solid"/>
-          <a:miter lim="800000"/>
+        </a:ln>
+        <a:ln w="25400" cap="flat" cmpd="sng" algn="ctr">
+          <a:solidFill>
+            <a:schemeClr val="phClr"/>
+          </a:solidFill>
+          <a:prstDash val="solid"/>
         </a:ln>
       </a:lnStyleLst>
       <a:effectStyleLst>
@@ -11635,16 +12857,33 @@
           <a:effectLst/>
         </a:effectStyle>
         <a:effectStyle>
-          <a:effectLst/>
+          <a:effectLst>
+            <a:outerShdw blurRad="38100" dist="25400" dir="2700000" algn="br" rotWithShape="0">
+              <a:srgbClr val="000000">
+                <a:alpha val="60000"/>
+              </a:srgbClr>
+            </a:outerShdw>
+          </a:effectLst>
         </a:effectStyle>
         <a:effectStyle>
           <a:effectLst>
-            <a:outerShdw blurRad="57150" dist="19050" dir="5400000" algn="ctr" rotWithShape="0">
+            <a:outerShdw blurRad="44450" dist="25400" dir="2700000" algn="br" rotWithShape="0">
               <a:srgbClr val="000000">
-                <a:alpha val="63000"/>
+                <a:alpha val="60000"/>
               </a:srgbClr>
             </a:outerShdw>
           </a:effectLst>
+          <a:scene3d>
+            <a:camera prst="orthographicFront">
+              <a:rot lat="0" lon="0" rev="0"/>
+            </a:camera>
+            <a:lightRig rig="threePt" dir="t">
+              <a:rot lat="0" lon="0" rev="19800000"/>
+            </a:lightRig>
+          </a:scene3d>
+          <a:sp3d prstMaterial="flat">
+            <a:bevelT w="25400" h="31750"/>
+          </a:sp3d>
         </a:effectStyle>
       </a:effectStyleLst>
       <a:bgFillStyleLst>
@@ -11653,36 +12892,36 @@
         </a:solidFill>
         <a:solidFill>
           <a:schemeClr val="phClr">
-            <a:tint val="95000"/>
-            <a:satMod val="170000"/>
+            <a:tint val="90000"/>
+            <a:shade val="97000"/>
+            <a:satMod val="130000"/>
           </a:schemeClr>
         </a:solidFill>
         <a:gradFill rotWithShape="1">
           <a:gsLst>
             <a:gs pos="0">
               <a:schemeClr val="phClr">
-                <a:tint val="93000"/>
-                <a:satMod val="150000"/>
-                <a:shade val="98000"/>
-                <a:lumMod val="102000"/>
+                <a:tint val="96000"/>
+                <a:shade val="99000"/>
+                <a:satMod val="140000"/>
               </a:schemeClr>
             </a:gs>
-            <a:gs pos="50000">
+            <a:gs pos="65000">
               <a:schemeClr val="phClr">
-                <a:tint val="98000"/>
+                <a:tint val="100000"/>
+                <a:shade val="80000"/>
                 <a:satMod val="130000"/>
-                <a:shade val="90000"/>
-                <a:lumMod val="103000"/>
               </a:schemeClr>
             </a:gs>
             <a:gs pos="100000">
               <a:schemeClr val="phClr">
-                <a:shade val="63000"/>
+                <a:tint val="100000"/>
+                <a:shade val="48000"/>
                 <a:satMod val="120000"/>
               </a:schemeClr>
             </a:gs>
           </a:gsLst>
-          <a:lin ang="5400000" scaled="0"/>
+          <a:lin ang="16200000" scaled="0"/>
         </a:gradFill>
       </a:bgFillStyleLst>
     </a:fmtScheme>
@@ -11691,7 +12930,7 @@
   <a:extraClrSchemeLst/>
   <a:extLst>
     <a:ext uri="{05A4C25C-085E-4340-85A3-A5531E510DB2}">
-      <thm15:themeFamily xmlns:thm15="http://schemas.microsoft.com/office/thememl/2012/main" name="Office Theme" id="{62F939B6-93AF-4DB8-9C6B-D6C7DFDC589F}" vid="{4A3C46E8-61CC-4603-A589-7422A47A8E4A}"/>
+      <thm15:themeFamily xmlns:thm15="http://schemas.microsoft.com/office/thememl/2012/main" name="Theme1" id="{58F53EFC-9D86-4E4E-9E24-9EAA355B016A}" vid="{BD32147A-0985-4690-BE30-2A28CACCC0CC}"/>
     </a:ext>
   </a:extLst>
 </a:theme>

</xml_diff>